<commit_message>
Small updates and added new figures
</commit_message>
<xml_diff>
--- a/LectureSlides/12_IntroductionToTimeSeriesForecasting.pptx
+++ b/LectureSlides/12_IntroductionToTimeSeriesForecasting.pptx
@@ -14,7 +14,7 @@
     <p:sldId id="262" r:id="rId8"/>
     <p:sldId id="263" r:id="rId9"/>
     <p:sldId id="264" r:id="rId10"/>
-    <p:sldId id="265" r:id="rId11"/>
+    <p:sldId id="341" r:id="rId11"/>
     <p:sldId id="266" r:id="rId12"/>
     <p:sldId id="267" r:id="rId13"/>
     <p:sldId id="268" r:id="rId14"/>
@@ -353,7 +353,7 @@
           <a:p>
             <a:fld id="{241EB5C9-1307-BA42-ABA2-0BC069CD8E7F}" type="datetimeFigureOut">
               <a:rPr lang="en-US" smtClean="0"/>
-              <a:t>11/2/2024</a:t>
+              <a:t>11/5/2024</a:t>
             </a:fld>
             <a:endParaRPr lang="en-US"/>
           </a:p>
@@ -521,7 +521,7 @@
           <a:p>
             <a:fld id="{241EB5C9-1307-BA42-ABA2-0BC069CD8E7F}" type="datetimeFigureOut">
               <a:rPr lang="en-US" smtClean="0"/>
-              <a:t>11/2/2024</a:t>
+              <a:t>11/5/2024</a:t>
             </a:fld>
             <a:endParaRPr lang="en-US"/>
           </a:p>
@@ -699,7 +699,7 @@
           <a:p>
             <a:fld id="{241EB5C9-1307-BA42-ABA2-0BC069CD8E7F}" type="datetimeFigureOut">
               <a:rPr lang="en-US" smtClean="0"/>
-              <a:t>11/2/2024</a:t>
+              <a:t>11/5/2024</a:t>
             </a:fld>
             <a:endParaRPr lang="en-US"/>
           </a:p>
@@ -867,7 +867,7 @@
           <a:p>
             <a:fld id="{241EB5C9-1307-BA42-ABA2-0BC069CD8E7F}" type="datetimeFigureOut">
               <a:rPr lang="en-US" smtClean="0"/>
-              <a:t>11/2/2024</a:t>
+              <a:t>11/5/2024</a:t>
             </a:fld>
             <a:endParaRPr lang="en-US"/>
           </a:p>
@@ -1112,7 +1112,7 @@
           <a:p>
             <a:fld id="{241EB5C9-1307-BA42-ABA2-0BC069CD8E7F}" type="datetimeFigureOut">
               <a:rPr lang="en-US" smtClean="0"/>
-              <a:t>11/2/2024</a:t>
+              <a:t>11/5/2024</a:t>
             </a:fld>
             <a:endParaRPr lang="en-US"/>
           </a:p>
@@ -1397,7 +1397,7 @@
           <a:p>
             <a:fld id="{241EB5C9-1307-BA42-ABA2-0BC069CD8E7F}" type="datetimeFigureOut">
               <a:rPr lang="en-US" smtClean="0"/>
-              <a:t>11/2/2024</a:t>
+              <a:t>11/5/2024</a:t>
             </a:fld>
             <a:endParaRPr lang="en-US"/>
           </a:p>
@@ -1816,7 +1816,7 @@
           <a:p>
             <a:fld id="{241EB5C9-1307-BA42-ABA2-0BC069CD8E7F}" type="datetimeFigureOut">
               <a:rPr lang="en-US" smtClean="0"/>
-              <a:t>11/2/2024</a:t>
+              <a:t>11/5/2024</a:t>
             </a:fld>
             <a:endParaRPr lang="en-US"/>
           </a:p>
@@ -1933,7 +1933,7 @@
           <a:p>
             <a:fld id="{241EB5C9-1307-BA42-ABA2-0BC069CD8E7F}" type="datetimeFigureOut">
               <a:rPr lang="en-US" smtClean="0"/>
-              <a:t>11/2/2024</a:t>
+              <a:t>11/5/2024</a:t>
             </a:fld>
             <a:endParaRPr lang="en-US"/>
           </a:p>
@@ -2028,7 +2028,7 @@
           <a:p>
             <a:fld id="{241EB5C9-1307-BA42-ABA2-0BC069CD8E7F}" type="datetimeFigureOut">
               <a:rPr lang="en-US" smtClean="0"/>
-              <a:t>11/2/2024</a:t>
+              <a:t>11/5/2024</a:t>
             </a:fld>
             <a:endParaRPr lang="en-US"/>
           </a:p>
@@ -2303,7 +2303,7 @@
           <a:p>
             <a:fld id="{241EB5C9-1307-BA42-ABA2-0BC069CD8E7F}" type="datetimeFigureOut">
               <a:rPr lang="en-US" smtClean="0"/>
-              <a:t>11/2/2024</a:t>
+              <a:t>11/5/2024</a:t>
             </a:fld>
             <a:endParaRPr lang="en-US"/>
           </a:p>
@@ -2555,7 +2555,7 @@
           <a:p>
             <a:fld id="{241EB5C9-1307-BA42-ABA2-0BC069CD8E7F}" type="datetimeFigureOut">
               <a:rPr lang="en-US" smtClean="0"/>
-              <a:t>11/2/2024</a:t>
+              <a:t>11/5/2024</a:t>
             </a:fld>
             <a:endParaRPr lang="en-US"/>
           </a:p>
@@ -2766,7 +2766,7 @@
           <a:p>
             <a:fld id="{241EB5C9-1307-BA42-ABA2-0BC069CD8E7F}" type="datetimeFigureOut">
               <a:rPr lang="en-US" smtClean="0"/>
-              <a:t>11/2/2024</a:t>
+              <a:t>11/5/2024</a:t>
             </a:fld>
             <a:endParaRPr lang="en-US"/>
           </a:p>
@@ -3334,7 +3334,13 @@
   <p:cSld>
     <p:spTree>
       <p:nvGrpSpPr>
-        <p:cNvPr id="1" name=""/>
+        <p:cNvPr id="1" name="">
+          <a:extLst>
+            <a:ext uri="{FF2B5EF4-FFF2-40B4-BE49-F238E27FC236}">
+              <a16:creationId xmlns:a16="http://schemas.microsoft.com/office/drawing/2014/main" id="{C7244B00-2CEB-46C2-CD68-A566AB4268B1}"/>
+            </a:ext>
+          </a:extLst>
+        </p:cNvPr>
         <p:cNvGrpSpPr/>
         <p:nvPr/>
       </p:nvGrpSpPr>
@@ -3348,7 +3354,13 @@
       </p:grpSpPr>
       <p:sp>
         <p:nvSpPr>
-          <p:cNvPr id="2" name="Title 1"/>
+          <p:cNvPr id="2" name="Title 1">
+            <a:extLst>
+              <a:ext uri="{FF2B5EF4-FFF2-40B4-BE49-F238E27FC236}">
+                <a16:creationId xmlns:a16="http://schemas.microsoft.com/office/drawing/2014/main" id="{02329D9B-9A58-4CEE-B53F-26AC367888EB}"/>
+              </a:ext>
+            </a:extLst>
+          </p:cNvPr>
           <p:cNvSpPr>
             <a:spLocks noGrp="1"/>
           </p:cNvSpPr>
@@ -3370,166 +3382,22 @@
           </a:p>
         </p:txBody>
       </p:sp>
-      <mc:AlternateContent xmlns:mc="http://schemas.openxmlformats.org/markup-compatibility/2006" xmlns:a14="http://schemas.microsoft.com/office/drawing/2010/main">
-        <mc:Choice Requires="a14">
-          <p:sp>
-            <p:nvSpPr>
-              <p:cNvPr id="3" name="Content Placeholder 2"/>
-              <p:cNvSpPr>
-                <a:spLocks noGrp="1"/>
-              </p:cNvSpPr>
-              <p:nvPr>
-                <p:ph idx="1"/>
-              </p:nvPr>
-            </p:nvSpPr>
-            <p:spPr/>
-            <p:txBody>
-              <a:bodyPr/>
-              <a:lstStyle/>
-              <a:p>
-                <a:pPr marL="0" lvl="0" indent="0">
-                  <a:buNone/>
-                </a:pPr>
-                <a:r>
-                  <a:t>How can we understand the AR model?</a:t>
-                </a:r>
-              </a:p>
-              <a:p>
-                <a:pPr lvl="0"/>
-                <a:r>
-                  <a:t>Consider an AR(2) model</a:t>
-                </a:r>
-                <a:br/>
-                <a:endParaRPr/>
-              </a:p>
-              <a:p>
-                <a:pPr lvl="0"/>
-                <a:r>
-                  <a:t>The value of </a:t>
-                </a:r>
-                <a14:m>
-                  <m:oMath xmlns:m="http://schemas.openxmlformats.org/officeDocument/2006/math">
-                    <m:sSub>
-                      <m:sSubPr>
-                        <m:ctrlPr>
-                          <a:rPr i="1">
-                            <a:latin typeface="Cambria Math" panose="02040503050406030204" pitchFamily="18" charset="0"/>
-                          </a:rPr>
-                        </m:ctrlPr>
-                      </m:sSubPr>
-                      <m:e>
-                        <m:r>
-                          <a:rPr>
-                            <a:latin typeface="Cambria Math" panose="02040503050406030204" pitchFamily="18" charset="0"/>
-                          </a:rPr>
-                          <m:t>𝑦</m:t>
-                        </m:r>
-                      </m:e>
-                      <m:sub>
-                        <m:r>
-                          <a:rPr>
-                            <a:latin typeface="Cambria Math" panose="02040503050406030204" pitchFamily="18" charset="0"/>
-                          </a:rPr>
-                          <m:t>𝑡</m:t>
-                        </m:r>
-                      </m:sub>
-                    </m:sSub>
-                  </m:oMath>
-                </a14:m>
-                <a:r>
-                  <a:t> is a weighted sum of </a:t>
-                </a:r>
-                <a14:m>
-                  <m:oMath xmlns:m="http://schemas.openxmlformats.org/officeDocument/2006/math">
-                    <m:r>
-                      <a:rPr>
-                        <a:latin typeface="Cambria Math" panose="02040503050406030204" pitchFamily="18" charset="0"/>
-                      </a:rPr>
-                      <m:t>𝑘</m:t>
-                    </m:r>
-                  </m:oMath>
-                </a14:m>
-                <a:r>
-                  <a:t> previous values plus an error term</a:t>
-                </a:r>
-              </a:p>
-            </p:txBody>
-          </p:sp>
-        </mc:Choice>
-        <mc:Fallback xmlns="">
-          <p:sp>
-            <p:nvSpPr>
-              <p:cNvPr id="3" name="Content Placeholder 2"/>
-              <p:cNvSpPr>
-                <a:spLocks noGrp="1" noRot="1" noChangeAspect="1" noMove="1" noResize="1" noEditPoints="1" noAdjustHandles="1" noChangeArrowheads="1" noChangeShapeType="1" noTextEdit="1"/>
-              </p:cNvSpPr>
-              <p:nvPr>
-                <p:ph idx="1"/>
-              </p:nvPr>
-            </p:nvSpPr>
-            <p:spPr>
-              <a:blipFill>
-                <a:blip r:embed="rId2"/>
-                <a:stretch>
-                  <a:fillRect l="-1111" t="-1436" r="-1185"/>
-                </a:stretch>
-              </a:blipFill>
-            </p:spPr>
-            <p:txBody>
-              <a:bodyPr/>
-              <a:lstStyle/>
-              <a:p>
-                <a:r>
-                  <a:rPr lang="en-US">
-                    <a:noFill/>
-                  </a:rPr>
-                  <a:t> </a:t>
-                </a:r>
-              </a:p>
-            </p:txBody>
-          </p:sp>
-        </mc:Fallback>
-      </mc:AlternateContent>
-      <p:pic>
-        <p:nvPicPr>
-          <p:cNvPr id="4" name="Picture 1" descr="../images/AR_Model.png"/>
-          <p:cNvPicPr>
-            <a:picLocks noGrp="1" noChangeAspect="1"/>
-          </p:cNvPicPr>
-          <p:nvPr/>
-        </p:nvPicPr>
-        <p:blipFill>
-          <a:blip r:embed="rId3"/>
-          <a:stretch>
-            <a:fillRect/>
-          </a:stretch>
-        </p:blipFill>
-        <p:spPr bwMode="auto">
-          <a:xfrm>
-            <a:off x="457200" y="1244600"/>
-            <a:ext cx="8229600" cy="2768600"/>
-          </a:xfrm>
-          <a:prstGeom prst="rect">
-            <a:avLst/>
-          </a:prstGeom>
-          <a:noFill/>
-          <a:ln w="9525">
-            <a:noFill/>
-            <a:headEnd/>
-            <a:tailEnd/>
-          </a:ln>
-        </p:spPr>
-      </p:pic>
       <p:sp>
         <p:nvSpPr>
-          <p:cNvPr id="5" name="TextBox 3"/>
+          <p:cNvPr id="5" name="TextBox 3">
+            <a:extLst>
+              <a:ext uri="{FF2B5EF4-FFF2-40B4-BE49-F238E27FC236}">
+                <a16:creationId xmlns:a16="http://schemas.microsoft.com/office/drawing/2014/main" id="{281CB2CE-434E-6D66-7DD8-095C63C70C5B}"/>
+              </a:ext>
+            </a:extLst>
+          </p:cNvPr>
           <p:cNvSpPr txBox="1"/>
           <p:nvPr/>
         </p:nvSpPr>
         <p:spPr>
           <a:xfrm>
-            <a:off x="457200" y="4076700"/>
-            <a:ext cx="8229600" cy="508000"/>
+            <a:off x="1999209" y="4229772"/>
+            <a:ext cx="5216236" cy="508000"/>
           </a:xfrm>
           <a:prstGeom prst="rect">
             <a:avLst/>
@@ -3544,13 +3412,1180 @@
               <a:buNone/>
             </a:pPr>
             <a:r>
-              <a:rPr dirty="0"/>
+              <a:rPr sz="2400" dirty="0"/>
               <a:t>Illustration of the AR(2) model</a:t>
             </a:r>
           </a:p>
         </p:txBody>
       </p:sp>
+      <mc:AlternateContent xmlns:mc="http://schemas.openxmlformats.org/markup-compatibility/2006">
+        <mc:Choice xmlns:a14="http://schemas.microsoft.com/office/drawing/2010/main" Requires="a14">
+          <p:sp>
+            <p:nvSpPr>
+              <p:cNvPr id="8" name="Oval 7">
+                <a:extLst>
+                  <a:ext uri="{FF2B5EF4-FFF2-40B4-BE49-F238E27FC236}">
+                    <a16:creationId xmlns:a16="http://schemas.microsoft.com/office/drawing/2014/main" id="{C568DFC0-A3A5-2BB4-9041-C48D1F1F6BC4}"/>
+                  </a:ext>
+                </a:extLst>
+              </p:cNvPr>
+              <p:cNvSpPr/>
+              <p:nvPr/>
+            </p:nvSpPr>
+            <p:spPr>
+              <a:xfrm>
+                <a:off x="6026728" y="2652099"/>
+                <a:ext cx="897774" cy="889462"/>
+              </a:xfrm>
+              <a:prstGeom prst="ellipse">
+                <a:avLst/>
+              </a:prstGeom>
+              <a:noFill/>
+              <a:ln w="19050">
+                <a:solidFill>
+                  <a:schemeClr val="tx1"/>
+                </a:solidFill>
+              </a:ln>
+            </p:spPr>
+            <p:style>
+              <a:lnRef idx="1">
+                <a:schemeClr val="accent1"/>
+              </a:lnRef>
+              <a:fillRef idx="3">
+                <a:schemeClr val="accent1"/>
+              </a:fillRef>
+              <a:effectRef idx="2">
+                <a:schemeClr val="accent1"/>
+              </a:effectRef>
+              <a:fontRef idx="minor">
+                <a:schemeClr val="lt1"/>
+              </a:fontRef>
+            </p:style>
+            <p:txBody>
+              <a:bodyPr rtlCol="0" anchor="ctr"/>
+              <a:lstStyle/>
+              <a:p>
+                <a:pPr algn="ctr"/>
+                <a14:m>
+                  <m:oMathPara xmlns:m="http://schemas.openxmlformats.org/officeDocument/2006/math">
+                    <m:oMathParaPr>
+                      <m:jc m:val="centerGroup"/>
+                    </m:oMathParaPr>
+                    <m:oMath xmlns:m="http://schemas.openxmlformats.org/officeDocument/2006/math">
+                      <m:sSub>
+                        <m:sSubPr>
+                          <m:ctrlPr>
+                            <a:rPr lang="en-US" sz="2400" i="1" smtClean="0">
+                              <a:solidFill>
+                                <a:schemeClr val="tx1"/>
+                              </a:solidFill>
+                              <a:latin typeface="Cambria Math" panose="02040503050406030204" pitchFamily="18" charset="0"/>
+                            </a:rPr>
+                          </m:ctrlPr>
+                        </m:sSubPr>
+                        <m:e>
+                          <m:r>
+                            <a:rPr lang="en-US" sz="2400" b="0" i="1" smtClean="0">
+                              <a:solidFill>
+                                <a:schemeClr val="tx1"/>
+                              </a:solidFill>
+                              <a:latin typeface="Cambria Math" panose="02040503050406030204" pitchFamily="18" charset="0"/>
+                            </a:rPr>
+                            <m:t>𝑦</m:t>
+                          </m:r>
+                        </m:e>
+                        <m:sub>
+                          <m:r>
+                            <a:rPr lang="en-US" sz="2400" b="0" i="1" smtClean="0">
+                              <a:solidFill>
+                                <a:schemeClr val="tx1"/>
+                              </a:solidFill>
+                              <a:latin typeface="Cambria Math" panose="02040503050406030204" pitchFamily="18" charset="0"/>
+                            </a:rPr>
+                            <m:t>𝑡</m:t>
+                          </m:r>
+                        </m:sub>
+                      </m:sSub>
+                    </m:oMath>
+                  </m:oMathPara>
+                </a14:m>
+                <a:endParaRPr lang="en-US" sz="2400" dirty="0"/>
+              </a:p>
+            </p:txBody>
+          </p:sp>
+        </mc:Choice>
+        <mc:Fallback>
+          <p:sp>
+            <p:nvSpPr>
+              <p:cNvPr id="8" name="Oval 7">
+                <a:extLst>
+                  <a:ext uri="{FF2B5EF4-FFF2-40B4-BE49-F238E27FC236}">
+                    <a16:creationId xmlns:a16="http://schemas.microsoft.com/office/drawing/2014/main" id="{C568DFC0-A3A5-2BB4-9041-C48D1F1F6BC4}"/>
+                  </a:ext>
+                </a:extLst>
+              </p:cNvPr>
+              <p:cNvSpPr>
+                <a:spLocks noRot="1" noChangeAspect="1" noMove="1" noResize="1" noEditPoints="1" noAdjustHandles="1" noChangeArrowheads="1" noChangeShapeType="1" noTextEdit="1"/>
+              </p:cNvSpPr>
+              <p:nvPr/>
+            </p:nvSpPr>
+            <p:spPr>
+              <a:xfrm>
+                <a:off x="6026728" y="2652099"/>
+                <a:ext cx="897774" cy="889462"/>
+              </a:xfrm>
+              <a:prstGeom prst="ellipse">
+                <a:avLst/>
+              </a:prstGeom>
+              <a:blipFill>
+                <a:blip r:embed="rId2"/>
+                <a:stretch>
+                  <a:fillRect/>
+                </a:stretch>
+              </a:blipFill>
+              <a:ln w="19050">
+                <a:solidFill>
+                  <a:schemeClr val="tx1"/>
+                </a:solidFill>
+              </a:ln>
+            </p:spPr>
+            <p:txBody>
+              <a:bodyPr/>
+              <a:lstStyle/>
+              <a:p>
+                <a:r>
+                  <a:rPr lang="en-US">
+                    <a:noFill/>
+                  </a:rPr>
+                  <a:t> </a:t>
+                </a:r>
+              </a:p>
+            </p:txBody>
+          </p:sp>
+        </mc:Fallback>
+      </mc:AlternateContent>
+      <mc:AlternateContent xmlns:mc="http://schemas.openxmlformats.org/markup-compatibility/2006">
+        <mc:Choice xmlns:a14="http://schemas.microsoft.com/office/drawing/2010/main" Requires="a14">
+          <p:sp>
+            <p:nvSpPr>
+              <p:cNvPr id="9" name="Oval 8">
+                <a:extLst>
+                  <a:ext uri="{FF2B5EF4-FFF2-40B4-BE49-F238E27FC236}">
+                    <a16:creationId xmlns:a16="http://schemas.microsoft.com/office/drawing/2014/main" id="{89EC6252-0A49-B273-DA59-75626C8E02FC}"/>
+                  </a:ext>
+                </a:extLst>
+              </p:cNvPr>
+              <p:cNvSpPr/>
+              <p:nvPr/>
+            </p:nvSpPr>
+            <p:spPr>
+              <a:xfrm>
+                <a:off x="3610495" y="2652099"/>
+                <a:ext cx="897774" cy="889462"/>
+              </a:xfrm>
+              <a:prstGeom prst="ellipse">
+                <a:avLst/>
+              </a:prstGeom>
+              <a:noFill/>
+              <a:ln w="19050">
+                <a:solidFill>
+                  <a:schemeClr val="tx1"/>
+                </a:solidFill>
+              </a:ln>
+            </p:spPr>
+            <p:style>
+              <a:lnRef idx="1">
+                <a:schemeClr val="accent1"/>
+              </a:lnRef>
+              <a:fillRef idx="3">
+                <a:schemeClr val="accent1"/>
+              </a:fillRef>
+              <a:effectRef idx="2">
+                <a:schemeClr val="accent1"/>
+              </a:effectRef>
+              <a:fontRef idx="minor">
+                <a:schemeClr val="lt1"/>
+              </a:fontRef>
+            </p:style>
+            <p:txBody>
+              <a:bodyPr rtlCol="0" anchor="ctr"/>
+              <a:lstStyle/>
+              <a:p>
+                <a:pPr algn="ctr"/>
+                <a14:m>
+                  <m:oMathPara xmlns:m="http://schemas.openxmlformats.org/officeDocument/2006/math">
+                    <m:oMathParaPr>
+                      <m:jc m:val="centerGroup"/>
+                    </m:oMathParaPr>
+                    <m:oMath xmlns:m="http://schemas.openxmlformats.org/officeDocument/2006/math">
+                      <m:sSub>
+                        <m:sSubPr>
+                          <m:ctrlPr>
+                            <a:rPr lang="en-US" sz="2400" i="1" smtClean="0">
+                              <a:solidFill>
+                                <a:schemeClr val="tx1"/>
+                              </a:solidFill>
+                              <a:latin typeface="Cambria Math" panose="02040503050406030204" pitchFamily="18" charset="0"/>
+                            </a:rPr>
+                          </m:ctrlPr>
+                        </m:sSubPr>
+                        <m:e>
+                          <m:r>
+                            <a:rPr lang="en-US" sz="2400" b="0" i="1" smtClean="0">
+                              <a:solidFill>
+                                <a:schemeClr val="tx1"/>
+                              </a:solidFill>
+                              <a:latin typeface="Cambria Math" panose="02040503050406030204" pitchFamily="18" charset="0"/>
+                            </a:rPr>
+                            <m:t>𝑦</m:t>
+                          </m:r>
+                        </m:e>
+                        <m:sub>
+                          <m:r>
+                            <a:rPr lang="en-US" sz="2400" b="0" i="1" smtClean="0">
+                              <a:solidFill>
+                                <a:schemeClr val="tx1"/>
+                              </a:solidFill>
+                              <a:latin typeface="Cambria Math" panose="02040503050406030204" pitchFamily="18" charset="0"/>
+                            </a:rPr>
+                            <m:t>𝑡</m:t>
+                          </m:r>
+                          <m:r>
+                            <a:rPr lang="en-US" sz="2400" b="0" i="1" smtClean="0">
+                              <a:solidFill>
+                                <a:schemeClr val="tx1"/>
+                              </a:solidFill>
+                              <a:latin typeface="Cambria Math" panose="02040503050406030204" pitchFamily="18" charset="0"/>
+                            </a:rPr>
+                            <m:t>−</m:t>
+                          </m:r>
+                          <m:r>
+                            <a:rPr lang="en-US" sz="2400" b="0" i="1" smtClean="0">
+                              <a:solidFill>
+                                <a:schemeClr val="tx1"/>
+                              </a:solidFill>
+                              <a:latin typeface="Cambria Math" panose="02040503050406030204" pitchFamily="18" charset="0"/>
+                            </a:rPr>
+                            <m:t>1</m:t>
+                          </m:r>
+                        </m:sub>
+                      </m:sSub>
+                    </m:oMath>
+                  </m:oMathPara>
+                </a14:m>
+                <a:endParaRPr lang="en-US" sz="2400" dirty="0"/>
+              </a:p>
+            </p:txBody>
+          </p:sp>
+        </mc:Choice>
+        <mc:Fallback>
+          <p:sp>
+            <p:nvSpPr>
+              <p:cNvPr id="9" name="Oval 8">
+                <a:extLst>
+                  <a:ext uri="{FF2B5EF4-FFF2-40B4-BE49-F238E27FC236}">
+                    <a16:creationId xmlns:a16="http://schemas.microsoft.com/office/drawing/2014/main" id="{89EC6252-0A49-B273-DA59-75626C8E02FC}"/>
+                  </a:ext>
+                </a:extLst>
+              </p:cNvPr>
+              <p:cNvSpPr>
+                <a:spLocks noRot="1" noChangeAspect="1" noMove="1" noResize="1" noEditPoints="1" noAdjustHandles="1" noChangeArrowheads="1" noChangeShapeType="1" noTextEdit="1"/>
+              </p:cNvSpPr>
+              <p:nvPr/>
+            </p:nvSpPr>
+            <p:spPr>
+              <a:xfrm>
+                <a:off x="3610495" y="2652099"/>
+                <a:ext cx="897774" cy="889462"/>
+              </a:xfrm>
+              <a:prstGeom prst="ellipse">
+                <a:avLst/>
+              </a:prstGeom>
+              <a:blipFill>
+                <a:blip r:embed="rId3"/>
+                <a:stretch>
+                  <a:fillRect/>
+                </a:stretch>
+              </a:blipFill>
+              <a:ln w="19050">
+                <a:solidFill>
+                  <a:schemeClr val="tx1"/>
+                </a:solidFill>
+              </a:ln>
+            </p:spPr>
+            <p:txBody>
+              <a:bodyPr/>
+              <a:lstStyle/>
+              <a:p>
+                <a:r>
+                  <a:rPr lang="en-US">
+                    <a:noFill/>
+                  </a:rPr>
+                  <a:t> </a:t>
+                </a:r>
+              </a:p>
+            </p:txBody>
+          </p:sp>
+        </mc:Fallback>
+      </mc:AlternateContent>
+      <mc:AlternateContent xmlns:mc="http://schemas.openxmlformats.org/markup-compatibility/2006">
+        <mc:Choice xmlns:a14="http://schemas.microsoft.com/office/drawing/2010/main" Requires="a14">
+          <p:sp>
+            <p:nvSpPr>
+              <p:cNvPr id="10" name="Oval 9">
+                <a:extLst>
+                  <a:ext uri="{FF2B5EF4-FFF2-40B4-BE49-F238E27FC236}">
+                    <a16:creationId xmlns:a16="http://schemas.microsoft.com/office/drawing/2014/main" id="{9D5E5178-5BE1-68BF-10BA-01FA84D522EB}"/>
+                  </a:ext>
+                </a:extLst>
+              </p:cNvPr>
+              <p:cNvSpPr/>
+              <p:nvPr/>
+            </p:nvSpPr>
+            <p:spPr>
+              <a:xfrm>
+                <a:off x="1194262" y="2652099"/>
+                <a:ext cx="897774" cy="889462"/>
+              </a:xfrm>
+              <a:prstGeom prst="ellipse">
+                <a:avLst/>
+              </a:prstGeom>
+              <a:noFill/>
+              <a:ln w="19050">
+                <a:solidFill>
+                  <a:schemeClr val="tx1"/>
+                </a:solidFill>
+              </a:ln>
+            </p:spPr>
+            <p:style>
+              <a:lnRef idx="1">
+                <a:schemeClr val="accent1"/>
+              </a:lnRef>
+              <a:fillRef idx="3">
+                <a:schemeClr val="accent1"/>
+              </a:fillRef>
+              <a:effectRef idx="2">
+                <a:schemeClr val="accent1"/>
+              </a:effectRef>
+              <a:fontRef idx="minor">
+                <a:schemeClr val="lt1"/>
+              </a:fontRef>
+            </p:style>
+            <p:txBody>
+              <a:bodyPr rtlCol="0" anchor="ctr"/>
+              <a:lstStyle/>
+              <a:p>
+                <a:pPr algn="ctr"/>
+                <a14:m>
+                  <m:oMathPara xmlns:m="http://schemas.openxmlformats.org/officeDocument/2006/math">
+                    <m:oMathParaPr>
+                      <m:jc m:val="centerGroup"/>
+                    </m:oMathParaPr>
+                    <m:oMath xmlns:m="http://schemas.openxmlformats.org/officeDocument/2006/math">
+                      <m:sSub>
+                        <m:sSubPr>
+                          <m:ctrlPr>
+                            <a:rPr lang="en-US" sz="2400" i="1" smtClean="0">
+                              <a:solidFill>
+                                <a:schemeClr val="tx1"/>
+                              </a:solidFill>
+                              <a:latin typeface="Cambria Math" panose="02040503050406030204" pitchFamily="18" charset="0"/>
+                            </a:rPr>
+                          </m:ctrlPr>
+                        </m:sSubPr>
+                        <m:e>
+                          <m:r>
+                            <a:rPr lang="en-US" sz="2400" b="0" i="1" smtClean="0">
+                              <a:solidFill>
+                                <a:schemeClr val="tx1"/>
+                              </a:solidFill>
+                              <a:latin typeface="Cambria Math" panose="02040503050406030204" pitchFamily="18" charset="0"/>
+                            </a:rPr>
+                            <m:t>𝑦</m:t>
+                          </m:r>
+                        </m:e>
+                        <m:sub>
+                          <m:r>
+                            <a:rPr lang="en-US" sz="2400" b="0" i="1" smtClean="0">
+                              <a:solidFill>
+                                <a:schemeClr val="tx1"/>
+                              </a:solidFill>
+                              <a:latin typeface="Cambria Math" panose="02040503050406030204" pitchFamily="18" charset="0"/>
+                            </a:rPr>
+                            <m:t>𝑡</m:t>
+                          </m:r>
+                          <m:r>
+                            <a:rPr lang="en-US" sz="2400" b="0" i="1" smtClean="0">
+                              <a:solidFill>
+                                <a:schemeClr val="tx1"/>
+                              </a:solidFill>
+                              <a:latin typeface="Cambria Math" panose="02040503050406030204" pitchFamily="18" charset="0"/>
+                            </a:rPr>
+                            <m:t>−</m:t>
+                          </m:r>
+                          <m:r>
+                            <a:rPr lang="en-US" sz="2400" b="0" i="1" smtClean="0">
+                              <a:solidFill>
+                                <a:schemeClr val="tx1"/>
+                              </a:solidFill>
+                              <a:latin typeface="Cambria Math" panose="02040503050406030204" pitchFamily="18" charset="0"/>
+                            </a:rPr>
+                            <m:t>2</m:t>
+                          </m:r>
+                        </m:sub>
+                      </m:sSub>
+                    </m:oMath>
+                  </m:oMathPara>
+                </a14:m>
+                <a:endParaRPr lang="en-US" sz="2400" dirty="0"/>
+              </a:p>
+            </p:txBody>
+          </p:sp>
+        </mc:Choice>
+        <mc:Fallback>
+          <p:sp>
+            <p:nvSpPr>
+              <p:cNvPr id="10" name="Oval 9">
+                <a:extLst>
+                  <a:ext uri="{FF2B5EF4-FFF2-40B4-BE49-F238E27FC236}">
+                    <a16:creationId xmlns:a16="http://schemas.microsoft.com/office/drawing/2014/main" id="{9D5E5178-5BE1-68BF-10BA-01FA84D522EB}"/>
+                  </a:ext>
+                </a:extLst>
+              </p:cNvPr>
+              <p:cNvSpPr>
+                <a:spLocks noRot="1" noChangeAspect="1" noMove="1" noResize="1" noEditPoints="1" noAdjustHandles="1" noChangeArrowheads="1" noChangeShapeType="1" noTextEdit="1"/>
+              </p:cNvSpPr>
+              <p:nvPr/>
+            </p:nvSpPr>
+            <p:spPr>
+              <a:xfrm>
+                <a:off x="1194262" y="2652099"/>
+                <a:ext cx="897774" cy="889462"/>
+              </a:xfrm>
+              <a:prstGeom prst="ellipse">
+                <a:avLst/>
+              </a:prstGeom>
+              <a:blipFill>
+                <a:blip r:embed="rId4"/>
+                <a:stretch>
+                  <a:fillRect/>
+                </a:stretch>
+              </a:blipFill>
+              <a:ln w="19050">
+                <a:solidFill>
+                  <a:schemeClr val="tx1"/>
+                </a:solidFill>
+              </a:ln>
+            </p:spPr>
+            <p:txBody>
+              <a:bodyPr/>
+              <a:lstStyle/>
+              <a:p>
+                <a:r>
+                  <a:rPr lang="en-US">
+                    <a:noFill/>
+                  </a:rPr>
+                  <a:t> </a:t>
+                </a:r>
+              </a:p>
+            </p:txBody>
+          </p:sp>
+        </mc:Fallback>
+      </mc:AlternateContent>
+      <mc:AlternateContent xmlns:mc="http://schemas.openxmlformats.org/markup-compatibility/2006">
+        <mc:Choice xmlns:a14="http://schemas.microsoft.com/office/drawing/2010/main" Requires="a14">
+          <p:sp>
+            <p:nvSpPr>
+              <p:cNvPr id="11" name="TextBox 10">
+                <a:extLst>
+                  <a:ext uri="{FF2B5EF4-FFF2-40B4-BE49-F238E27FC236}">
+                    <a16:creationId xmlns:a16="http://schemas.microsoft.com/office/drawing/2014/main" id="{492126E5-77F5-B500-76EF-6AB53D23E0A8}"/>
+                  </a:ext>
+                </a:extLst>
+              </p:cNvPr>
+              <p:cNvSpPr txBox="1"/>
+              <p:nvPr/>
+            </p:nvSpPr>
+            <p:spPr>
+              <a:xfrm>
+                <a:off x="4908665" y="3507971"/>
+                <a:ext cx="3990109" cy="461665"/>
+              </a:xfrm>
+              <a:prstGeom prst="rect">
+                <a:avLst/>
+              </a:prstGeom>
+              <a:noFill/>
+            </p:spPr>
+            <p:txBody>
+              <a:bodyPr wrap="square" rtlCol="0">
+                <a:spAutoFit/>
+              </a:bodyPr>
+              <a:lstStyle/>
+              <a:p>
+                <a14:m>
+                  <m:oMathPara xmlns:m="http://schemas.openxmlformats.org/officeDocument/2006/math">
+                    <m:oMathParaPr>
+                      <m:jc m:val="centerGroup"/>
+                    </m:oMathParaPr>
+                    <m:oMath xmlns:m="http://schemas.openxmlformats.org/officeDocument/2006/math">
+                      <m:sSub>
+                        <m:sSubPr>
+                          <m:ctrlPr>
+                            <a:rPr lang="en-US" sz="2400" i="1" smtClean="0">
+                              <a:latin typeface="Cambria Math" panose="02040503050406030204" pitchFamily="18" charset="0"/>
+                            </a:rPr>
+                          </m:ctrlPr>
+                        </m:sSubPr>
+                        <m:e>
+                          <m:r>
+                            <a:rPr lang="en-US" sz="2400" b="0" i="1" smtClean="0">
+                              <a:latin typeface="Cambria Math" panose="02040503050406030204" pitchFamily="18" charset="0"/>
+                            </a:rPr>
+                            <m:t>𝑦</m:t>
+                          </m:r>
+                        </m:e>
+                        <m:sub>
+                          <m:r>
+                            <a:rPr lang="en-US" sz="2400" b="0" i="1" smtClean="0">
+                              <a:latin typeface="Cambria Math" panose="02040503050406030204" pitchFamily="18" charset="0"/>
+                            </a:rPr>
+                            <m:t>𝑡</m:t>
+                          </m:r>
+                        </m:sub>
+                      </m:sSub>
+                      <m:r>
+                        <a:rPr lang="en-US" sz="2400" b="0" i="1" smtClean="0">
+                          <a:latin typeface="Cambria Math" panose="02040503050406030204" pitchFamily="18" charset="0"/>
+                        </a:rPr>
+                        <m:t>=</m:t>
+                      </m:r>
+                      <m:sSub>
+                        <m:sSubPr>
+                          <m:ctrlPr>
+                            <a:rPr lang="en-US" sz="2400" b="0" i="1" smtClean="0">
+                              <a:latin typeface="Cambria Math" panose="02040503050406030204" pitchFamily="18" charset="0"/>
+                            </a:rPr>
+                          </m:ctrlPr>
+                        </m:sSubPr>
+                        <m:e>
+                          <m:r>
+                            <a:rPr lang="en-US" sz="2400" b="0" i="1" smtClean="0">
+                              <a:latin typeface="Cambria Math" panose="02040503050406030204" pitchFamily="18" charset="0"/>
+                              <a:ea typeface="Cambria Math" panose="02040503050406030204" pitchFamily="18" charset="0"/>
+                            </a:rPr>
+                            <m:t>𝜙</m:t>
+                          </m:r>
+                        </m:e>
+                        <m:sub>
+                          <m:r>
+                            <a:rPr lang="en-US" sz="2400" b="0" i="1" smtClean="0">
+                              <a:latin typeface="Cambria Math" panose="02040503050406030204" pitchFamily="18" charset="0"/>
+                            </a:rPr>
+                            <m:t>1</m:t>
+                          </m:r>
+                        </m:sub>
+                      </m:sSub>
+                      <m:sSub>
+                        <m:sSubPr>
+                          <m:ctrlPr>
+                            <a:rPr lang="en-US" sz="2400" i="1">
+                              <a:latin typeface="Cambria Math" panose="02040503050406030204" pitchFamily="18" charset="0"/>
+                            </a:rPr>
+                          </m:ctrlPr>
+                        </m:sSubPr>
+                        <m:e>
+                          <m:r>
+                            <a:rPr lang="en-US" sz="2400" i="1">
+                              <a:latin typeface="Cambria Math" panose="02040503050406030204" pitchFamily="18" charset="0"/>
+                            </a:rPr>
+                            <m:t>𝑦</m:t>
+                          </m:r>
+                        </m:e>
+                        <m:sub>
+                          <m:r>
+                            <a:rPr lang="en-US" sz="2400" i="1">
+                              <a:latin typeface="Cambria Math" panose="02040503050406030204" pitchFamily="18" charset="0"/>
+                            </a:rPr>
+                            <m:t>𝑡</m:t>
+                          </m:r>
+                          <m:r>
+                            <a:rPr lang="en-US" sz="2400" b="0" i="1" smtClean="0">
+                              <a:latin typeface="Cambria Math" panose="02040503050406030204" pitchFamily="18" charset="0"/>
+                            </a:rPr>
+                            <m:t>−</m:t>
+                          </m:r>
+                          <m:r>
+                            <a:rPr lang="en-US" sz="2400" b="0" i="1" smtClean="0">
+                              <a:latin typeface="Cambria Math" panose="02040503050406030204" pitchFamily="18" charset="0"/>
+                            </a:rPr>
+                            <m:t>1</m:t>
+                          </m:r>
+                        </m:sub>
+                      </m:sSub>
+                      <m:r>
+                        <a:rPr lang="en-US" sz="2400" b="0" i="1" smtClean="0">
+                          <a:latin typeface="Cambria Math" panose="02040503050406030204" pitchFamily="18" charset="0"/>
+                        </a:rPr>
+                        <m:t>+</m:t>
+                      </m:r>
+                      <m:sSub>
+                        <m:sSubPr>
+                          <m:ctrlPr>
+                            <a:rPr lang="en-US" sz="2400" i="1">
+                              <a:latin typeface="Cambria Math" panose="02040503050406030204" pitchFamily="18" charset="0"/>
+                            </a:rPr>
+                          </m:ctrlPr>
+                        </m:sSubPr>
+                        <m:e>
+                          <m:r>
+                            <a:rPr lang="en-US" sz="2400" i="1">
+                              <a:latin typeface="Cambria Math" panose="02040503050406030204" pitchFamily="18" charset="0"/>
+                              <a:ea typeface="Cambria Math" panose="02040503050406030204" pitchFamily="18" charset="0"/>
+                            </a:rPr>
+                            <m:t>𝜙</m:t>
+                          </m:r>
+                        </m:e>
+                        <m:sub>
+                          <m:r>
+                            <a:rPr lang="en-US" sz="2400" b="0" i="1" smtClean="0">
+                              <a:latin typeface="Cambria Math" panose="02040503050406030204" pitchFamily="18" charset="0"/>
+                              <a:ea typeface="Cambria Math" panose="02040503050406030204" pitchFamily="18" charset="0"/>
+                            </a:rPr>
+                            <m:t>2</m:t>
+                          </m:r>
+                        </m:sub>
+                      </m:sSub>
+                      <m:sSub>
+                        <m:sSubPr>
+                          <m:ctrlPr>
+                            <a:rPr lang="en-US" sz="2400" i="1">
+                              <a:latin typeface="Cambria Math" panose="02040503050406030204" pitchFamily="18" charset="0"/>
+                            </a:rPr>
+                          </m:ctrlPr>
+                        </m:sSubPr>
+                        <m:e>
+                          <m:r>
+                            <a:rPr lang="en-US" sz="2400" i="1">
+                              <a:latin typeface="Cambria Math" panose="02040503050406030204" pitchFamily="18" charset="0"/>
+                            </a:rPr>
+                            <m:t>𝑦</m:t>
+                          </m:r>
+                        </m:e>
+                        <m:sub>
+                          <m:r>
+                            <a:rPr lang="en-US" sz="2400" i="1">
+                              <a:latin typeface="Cambria Math" panose="02040503050406030204" pitchFamily="18" charset="0"/>
+                            </a:rPr>
+                            <m:t>𝑡</m:t>
+                          </m:r>
+                          <m:r>
+                            <a:rPr lang="en-US" sz="2400" i="1">
+                              <a:latin typeface="Cambria Math" panose="02040503050406030204" pitchFamily="18" charset="0"/>
+                            </a:rPr>
+                            <m:t>−</m:t>
+                          </m:r>
+                          <m:r>
+                            <a:rPr lang="en-US" sz="2400" b="0" i="1" smtClean="0">
+                              <a:latin typeface="Cambria Math" panose="02040503050406030204" pitchFamily="18" charset="0"/>
+                            </a:rPr>
+                            <m:t>2</m:t>
+                          </m:r>
+                        </m:sub>
+                      </m:sSub>
+                      <m:r>
+                        <a:rPr lang="en-US" sz="2400" i="1">
+                          <a:latin typeface="Cambria Math" panose="02040503050406030204" pitchFamily="18" charset="0"/>
+                        </a:rPr>
+                        <m:t>+</m:t>
+                      </m:r>
+                      <m:sSub>
+                        <m:sSubPr>
+                          <m:ctrlPr>
+                            <a:rPr lang="en-US" sz="2400" b="0" i="1" smtClean="0">
+                              <a:latin typeface="Cambria Math" panose="02040503050406030204" pitchFamily="18" charset="0"/>
+                            </a:rPr>
+                          </m:ctrlPr>
+                        </m:sSubPr>
+                        <m:e>
+                          <m:r>
+                            <a:rPr lang="en-US" sz="2400" b="0" i="1" smtClean="0">
+                              <a:latin typeface="Cambria Math" panose="02040503050406030204" pitchFamily="18" charset="0"/>
+                            </a:rPr>
+                            <m:t>𝑤</m:t>
+                          </m:r>
+                        </m:e>
+                        <m:sub>
+                          <m:r>
+                            <a:rPr lang="en-US" sz="2400" b="0" i="1" smtClean="0">
+                              <a:latin typeface="Cambria Math" panose="02040503050406030204" pitchFamily="18" charset="0"/>
+                            </a:rPr>
+                            <m:t>𝑡</m:t>
+                          </m:r>
+                        </m:sub>
+                      </m:sSub>
+                    </m:oMath>
+                  </m:oMathPara>
+                </a14:m>
+                <a:endParaRPr lang="en-US" sz="2400" dirty="0"/>
+              </a:p>
+            </p:txBody>
+          </p:sp>
+        </mc:Choice>
+        <mc:Fallback>
+          <p:sp>
+            <p:nvSpPr>
+              <p:cNvPr id="11" name="TextBox 10">
+                <a:extLst>
+                  <a:ext uri="{FF2B5EF4-FFF2-40B4-BE49-F238E27FC236}">
+                    <a16:creationId xmlns:a16="http://schemas.microsoft.com/office/drawing/2014/main" id="{492126E5-77F5-B500-76EF-6AB53D23E0A8}"/>
+                  </a:ext>
+                </a:extLst>
+              </p:cNvPr>
+              <p:cNvSpPr txBox="1">
+                <a:spLocks noRot="1" noChangeAspect="1" noMove="1" noResize="1" noEditPoints="1" noAdjustHandles="1" noChangeArrowheads="1" noChangeShapeType="1" noTextEdit="1"/>
+              </p:cNvSpPr>
+              <p:nvPr/>
+            </p:nvSpPr>
+            <p:spPr>
+              <a:xfrm>
+                <a:off x="4908665" y="3507971"/>
+                <a:ext cx="3990109" cy="461665"/>
+              </a:xfrm>
+              <a:prstGeom prst="rect">
+                <a:avLst/>
+              </a:prstGeom>
+              <a:blipFill>
+                <a:blip r:embed="rId5"/>
+                <a:stretch>
+                  <a:fillRect b="-17105"/>
+                </a:stretch>
+              </a:blipFill>
+            </p:spPr>
+            <p:txBody>
+              <a:bodyPr/>
+              <a:lstStyle/>
+              <a:p>
+                <a:r>
+                  <a:rPr lang="en-US">
+                    <a:noFill/>
+                  </a:rPr>
+                  <a:t> </a:t>
+                </a:r>
+              </a:p>
+            </p:txBody>
+          </p:sp>
+        </mc:Fallback>
+      </mc:AlternateContent>
+      <p:sp>
+        <p:nvSpPr>
+          <p:cNvPr id="12" name="Arc 11">
+            <a:extLst>
+              <a:ext uri="{FF2B5EF4-FFF2-40B4-BE49-F238E27FC236}">
+                <a16:creationId xmlns:a16="http://schemas.microsoft.com/office/drawing/2014/main" id="{CA261A37-D446-1975-7807-E06AA0F2032B}"/>
+              </a:ext>
+            </a:extLst>
+          </p:cNvPr>
+          <p:cNvSpPr/>
+          <p:nvPr/>
+        </p:nvSpPr>
+        <p:spPr>
+          <a:xfrm rot="19447016">
+            <a:off x="2947082" y="2404485"/>
+            <a:ext cx="3633691" cy="2727914"/>
+          </a:xfrm>
+          <a:prstGeom prst="arc">
+            <a:avLst/>
+          </a:prstGeom>
+          <a:ln>
+            <a:solidFill>
+              <a:schemeClr val="tx1"/>
+            </a:solidFill>
+            <a:tailEnd type="triangle"/>
+          </a:ln>
+        </p:spPr>
+        <p:style>
+          <a:lnRef idx="2">
+            <a:schemeClr val="accent1"/>
+          </a:lnRef>
+          <a:fillRef idx="0">
+            <a:schemeClr val="accent1"/>
+          </a:fillRef>
+          <a:effectRef idx="1">
+            <a:schemeClr val="accent1"/>
+          </a:effectRef>
+          <a:fontRef idx="minor">
+            <a:schemeClr val="tx1"/>
+          </a:fontRef>
+        </p:style>
+        <p:txBody>
+          <a:bodyPr rtlCol="0" anchor="ctr"/>
+          <a:lstStyle/>
+          <a:p>
+            <a:pPr algn="ctr"/>
+            <a:endParaRPr lang="en-US"/>
+          </a:p>
+        </p:txBody>
+      </p:sp>
+      <p:sp>
+        <p:nvSpPr>
+          <p:cNvPr id="13" name="Arc 12">
+            <a:extLst>
+              <a:ext uri="{FF2B5EF4-FFF2-40B4-BE49-F238E27FC236}">
+                <a16:creationId xmlns:a16="http://schemas.microsoft.com/office/drawing/2014/main" id="{BC041336-9317-47F0-D18B-102BAB19ED85}"/>
+              </a:ext>
+            </a:extLst>
+          </p:cNvPr>
+          <p:cNvSpPr/>
+          <p:nvPr/>
+        </p:nvSpPr>
+        <p:spPr>
+          <a:xfrm rot="19303106">
+            <a:off x="-416122" y="1996665"/>
+            <a:ext cx="7807424" cy="6179435"/>
+          </a:xfrm>
+          <a:prstGeom prst="arc">
+            <a:avLst/>
+          </a:prstGeom>
+          <a:ln>
+            <a:solidFill>
+              <a:schemeClr val="tx1"/>
+            </a:solidFill>
+            <a:tailEnd type="triangle"/>
+          </a:ln>
+        </p:spPr>
+        <p:style>
+          <a:lnRef idx="2">
+            <a:schemeClr val="accent1"/>
+          </a:lnRef>
+          <a:fillRef idx="0">
+            <a:schemeClr val="accent1"/>
+          </a:fillRef>
+          <a:effectRef idx="1">
+            <a:schemeClr val="accent1"/>
+          </a:effectRef>
+          <a:fontRef idx="minor">
+            <a:schemeClr val="tx1"/>
+          </a:fontRef>
+        </p:style>
+        <p:txBody>
+          <a:bodyPr rtlCol="0" anchor="ctr"/>
+          <a:lstStyle/>
+          <a:p>
+            <a:pPr algn="ctr"/>
+            <a:endParaRPr lang="en-US"/>
+          </a:p>
+        </p:txBody>
+      </p:sp>
+      <mc:AlternateContent xmlns:mc="http://schemas.openxmlformats.org/markup-compatibility/2006">
+        <mc:Choice xmlns:a14="http://schemas.microsoft.com/office/drawing/2010/main" Requires="a14">
+          <p:sp>
+            <p:nvSpPr>
+              <p:cNvPr id="14" name="TextBox 13">
+                <a:extLst>
+                  <a:ext uri="{FF2B5EF4-FFF2-40B4-BE49-F238E27FC236}">
+                    <a16:creationId xmlns:a16="http://schemas.microsoft.com/office/drawing/2014/main" id="{DF8A3268-F6E8-8D53-61B4-8E71EDE1400F}"/>
+                  </a:ext>
+                </a:extLst>
+              </p:cNvPr>
+              <p:cNvSpPr txBox="1"/>
+              <p:nvPr/>
+            </p:nvSpPr>
+            <p:spPr>
+              <a:xfrm>
+                <a:off x="4849091" y="2270783"/>
+                <a:ext cx="1201187" cy="461665"/>
+              </a:xfrm>
+              <a:prstGeom prst="rect">
+                <a:avLst/>
+              </a:prstGeom>
+              <a:noFill/>
+            </p:spPr>
+            <p:txBody>
+              <a:bodyPr wrap="square" rtlCol="0">
+                <a:spAutoFit/>
+              </a:bodyPr>
+              <a:lstStyle/>
+              <a:p>
+                <a14:m>
+                  <m:oMathPara xmlns:m="http://schemas.openxmlformats.org/officeDocument/2006/math">
+                    <m:oMathParaPr>
+                      <m:jc m:val="centerGroup"/>
+                    </m:oMathParaPr>
+                    <m:oMath xmlns:m="http://schemas.openxmlformats.org/officeDocument/2006/math">
+                      <m:sSub>
+                        <m:sSubPr>
+                          <m:ctrlPr>
+                            <a:rPr lang="en-US" sz="2400" b="0" i="1" smtClean="0">
+                              <a:latin typeface="Cambria Math" panose="02040503050406030204" pitchFamily="18" charset="0"/>
+                            </a:rPr>
+                          </m:ctrlPr>
+                        </m:sSubPr>
+                        <m:e>
+                          <m:r>
+                            <a:rPr lang="en-US" sz="2400" b="0" i="1" smtClean="0">
+                              <a:latin typeface="Cambria Math" panose="02040503050406030204" pitchFamily="18" charset="0"/>
+                              <a:ea typeface="Cambria Math" panose="02040503050406030204" pitchFamily="18" charset="0"/>
+                            </a:rPr>
+                            <m:t>𝜙</m:t>
+                          </m:r>
+                        </m:e>
+                        <m:sub>
+                          <m:r>
+                            <a:rPr lang="en-US" sz="2400" b="0" i="1" smtClean="0">
+                              <a:latin typeface="Cambria Math" panose="02040503050406030204" pitchFamily="18" charset="0"/>
+                            </a:rPr>
+                            <m:t>1</m:t>
+                          </m:r>
+                        </m:sub>
+                      </m:sSub>
+                      <m:sSub>
+                        <m:sSubPr>
+                          <m:ctrlPr>
+                            <a:rPr lang="en-US" sz="2400" i="1">
+                              <a:latin typeface="Cambria Math" panose="02040503050406030204" pitchFamily="18" charset="0"/>
+                            </a:rPr>
+                          </m:ctrlPr>
+                        </m:sSubPr>
+                        <m:e>
+                          <m:r>
+                            <a:rPr lang="en-US" sz="2400" i="1">
+                              <a:latin typeface="Cambria Math" panose="02040503050406030204" pitchFamily="18" charset="0"/>
+                            </a:rPr>
+                            <m:t>𝑦</m:t>
+                          </m:r>
+                        </m:e>
+                        <m:sub>
+                          <m:r>
+                            <a:rPr lang="en-US" sz="2400" i="1">
+                              <a:latin typeface="Cambria Math" panose="02040503050406030204" pitchFamily="18" charset="0"/>
+                            </a:rPr>
+                            <m:t>𝑡</m:t>
+                          </m:r>
+                          <m:r>
+                            <a:rPr lang="en-US" sz="2400" b="0" i="1" smtClean="0">
+                              <a:latin typeface="Cambria Math" panose="02040503050406030204" pitchFamily="18" charset="0"/>
+                            </a:rPr>
+                            <m:t>−</m:t>
+                          </m:r>
+                          <m:r>
+                            <a:rPr lang="en-US" sz="2400" b="0" i="1" smtClean="0">
+                              <a:latin typeface="Cambria Math" panose="02040503050406030204" pitchFamily="18" charset="0"/>
+                            </a:rPr>
+                            <m:t>1</m:t>
+                          </m:r>
+                        </m:sub>
+                      </m:sSub>
+                    </m:oMath>
+                  </m:oMathPara>
+                </a14:m>
+                <a:endParaRPr lang="en-US" sz="2400" dirty="0"/>
+              </a:p>
+            </p:txBody>
+          </p:sp>
+        </mc:Choice>
+        <mc:Fallback>
+          <p:sp>
+            <p:nvSpPr>
+              <p:cNvPr id="14" name="TextBox 13">
+                <a:extLst>
+                  <a:ext uri="{FF2B5EF4-FFF2-40B4-BE49-F238E27FC236}">
+                    <a16:creationId xmlns:a16="http://schemas.microsoft.com/office/drawing/2014/main" id="{DF8A3268-F6E8-8D53-61B4-8E71EDE1400F}"/>
+                  </a:ext>
+                </a:extLst>
+              </p:cNvPr>
+              <p:cNvSpPr txBox="1">
+                <a:spLocks noRot="1" noChangeAspect="1" noMove="1" noResize="1" noEditPoints="1" noAdjustHandles="1" noChangeArrowheads="1" noChangeShapeType="1" noTextEdit="1"/>
+              </p:cNvSpPr>
+              <p:nvPr/>
+            </p:nvSpPr>
+            <p:spPr>
+              <a:xfrm>
+                <a:off x="4849091" y="2270783"/>
+                <a:ext cx="1201187" cy="461665"/>
+              </a:xfrm>
+              <a:prstGeom prst="rect">
+                <a:avLst/>
+              </a:prstGeom>
+              <a:blipFill>
+                <a:blip r:embed="rId6"/>
+                <a:stretch>
+                  <a:fillRect b="-17333"/>
+                </a:stretch>
+              </a:blipFill>
+            </p:spPr>
+            <p:txBody>
+              <a:bodyPr/>
+              <a:lstStyle/>
+              <a:p>
+                <a:r>
+                  <a:rPr lang="en-US">
+                    <a:noFill/>
+                  </a:rPr>
+                  <a:t> </a:t>
+                </a:r>
+              </a:p>
+            </p:txBody>
+          </p:sp>
+        </mc:Fallback>
+      </mc:AlternateContent>
+      <mc:AlternateContent xmlns:mc="http://schemas.openxmlformats.org/markup-compatibility/2006">
+        <mc:Choice xmlns:a14="http://schemas.microsoft.com/office/drawing/2010/main" Requires="a14">
+          <p:sp>
+            <p:nvSpPr>
+              <p:cNvPr id="15" name="TextBox 14">
+                <a:extLst>
+                  <a:ext uri="{FF2B5EF4-FFF2-40B4-BE49-F238E27FC236}">
+                    <a16:creationId xmlns:a16="http://schemas.microsoft.com/office/drawing/2014/main" id="{5E6D85BD-4480-62D5-0AA9-C18C026E58C2}"/>
+                  </a:ext>
+                </a:extLst>
+              </p:cNvPr>
+              <p:cNvSpPr txBox="1"/>
+              <p:nvPr/>
+            </p:nvSpPr>
+            <p:spPr>
+              <a:xfrm>
+                <a:off x="3713754" y="1650087"/>
+                <a:ext cx="1201187" cy="461665"/>
+              </a:xfrm>
+              <a:prstGeom prst="rect">
+                <a:avLst/>
+              </a:prstGeom>
+              <a:noFill/>
+            </p:spPr>
+            <p:txBody>
+              <a:bodyPr wrap="square" rtlCol="0">
+                <a:spAutoFit/>
+              </a:bodyPr>
+              <a:lstStyle/>
+              <a:p>
+                <a14:m>
+                  <m:oMathPara xmlns:m="http://schemas.openxmlformats.org/officeDocument/2006/math">
+                    <m:oMathParaPr>
+                      <m:jc m:val="centerGroup"/>
+                    </m:oMathParaPr>
+                    <m:oMath xmlns:m="http://schemas.openxmlformats.org/officeDocument/2006/math">
+                      <m:sSub>
+                        <m:sSubPr>
+                          <m:ctrlPr>
+                            <a:rPr lang="en-US" sz="2400" b="0" i="1" smtClean="0">
+                              <a:latin typeface="Cambria Math" panose="02040503050406030204" pitchFamily="18" charset="0"/>
+                            </a:rPr>
+                          </m:ctrlPr>
+                        </m:sSubPr>
+                        <m:e>
+                          <m:r>
+                            <a:rPr lang="en-US" sz="2400" b="0" i="1" smtClean="0">
+                              <a:latin typeface="Cambria Math" panose="02040503050406030204" pitchFamily="18" charset="0"/>
+                              <a:ea typeface="Cambria Math" panose="02040503050406030204" pitchFamily="18" charset="0"/>
+                            </a:rPr>
+                            <m:t>𝜙</m:t>
+                          </m:r>
+                        </m:e>
+                        <m:sub>
+                          <m:r>
+                            <a:rPr lang="en-US" sz="2400" b="0" i="1" smtClean="0">
+                              <a:latin typeface="Cambria Math" panose="02040503050406030204" pitchFamily="18" charset="0"/>
+                            </a:rPr>
+                            <m:t>2</m:t>
+                          </m:r>
+                        </m:sub>
+                      </m:sSub>
+                      <m:sSub>
+                        <m:sSubPr>
+                          <m:ctrlPr>
+                            <a:rPr lang="en-US" sz="2400" i="1">
+                              <a:latin typeface="Cambria Math" panose="02040503050406030204" pitchFamily="18" charset="0"/>
+                            </a:rPr>
+                          </m:ctrlPr>
+                        </m:sSubPr>
+                        <m:e>
+                          <m:r>
+                            <a:rPr lang="en-US" sz="2400" i="1">
+                              <a:latin typeface="Cambria Math" panose="02040503050406030204" pitchFamily="18" charset="0"/>
+                            </a:rPr>
+                            <m:t>𝑦</m:t>
+                          </m:r>
+                        </m:e>
+                        <m:sub>
+                          <m:r>
+                            <a:rPr lang="en-US" sz="2400" i="1">
+                              <a:latin typeface="Cambria Math" panose="02040503050406030204" pitchFamily="18" charset="0"/>
+                            </a:rPr>
+                            <m:t>𝑡</m:t>
+                          </m:r>
+                          <m:r>
+                            <a:rPr lang="en-US" sz="2400" b="0" i="1" smtClean="0">
+                              <a:latin typeface="Cambria Math" panose="02040503050406030204" pitchFamily="18" charset="0"/>
+                            </a:rPr>
+                            <m:t>−</m:t>
+                          </m:r>
+                          <m:r>
+                            <a:rPr lang="en-US" sz="2400" b="0" i="1" smtClean="0">
+                              <a:latin typeface="Cambria Math" panose="02040503050406030204" pitchFamily="18" charset="0"/>
+                            </a:rPr>
+                            <m:t>2</m:t>
+                          </m:r>
+                        </m:sub>
+                      </m:sSub>
+                    </m:oMath>
+                  </m:oMathPara>
+                </a14:m>
+                <a:endParaRPr lang="en-US" sz="2400" dirty="0"/>
+              </a:p>
+            </p:txBody>
+          </p:sp>
+        </mc:Choice>
+        <mc:Fallback>
+          <p:sp>
+            <p:nvSpPr>
+              <p:cNvPr id="15" name="TextBox 14">
+                <a:extLst>
+                  <a:ext uri="{FF2B5EF4-FFF2-40B4-BE49-F238E27FC236}">
+                    <a16:creationId xmlns:a16="http://schemas.microsoft.com/office/drawing/2014/main" id="{5E6D85BD-4480-62D5-0AA9-C18C026E58C2}"/>
+                  </a:ext>
+                </a:extLst>
+              </p:cNvPr>
+              <p:cNvSpPr txBox="1">
+                <a:spLocks noRot="1" noChangeAspect="1" noMove="1" noResize="1" noEditPoints="1" noAdjustHandles="1" noChangeArrowheads="1" noChangeShapeType="1" noTextEdit="1"/>
+              </p:cNvSpPr>
+              <p:nvPr/>
+            </p:nvSpPr>
+            <p:spPr>
+              <a:xfrm>
+                <a:off x="3713754" y="1650087"/>
+                <a:ext cx="1201187" cy="461665"/>
+              </a:xfrm>
+              <a:prstGeom prst="rect">
+                <a:avLst/>
+              </a:prstGeom>
+              <a:blipFill>
+                <a:blip r:embed="rId7"/>
+                <a:stretch>
+                  <a:fillRect b="-17333"/>
+                </a:stretch>
+              </a:blipFill>
+            </p:spPr>
+            <p:txBody>
+              <a:bodyPr/>
+              <a:lstStyle/>
+              <a:p>
+                <a:r>
+                  <a:rPr lang="en-US">
+                    <a:noFill/>
+                  </a:rPr>
+                  <a:t> </a:t>
+                </a:r>
+              </a:p>
+            </p:txBody>
+          </p:sp>
+        </mc:Fallback>
+      </mc:AlternateContent>
     </p:spTree>
+    <p:extLst>
+      <p:ext uri="{BB962C8B-B14F-4D97-AF65-F5344CB8AC3E}">
+        <p14:creationId xmlns:p14="http://schemas.microsoft.com/office/powerpoint/2010/main" val="2176308664"/>
+      </p:ext>
+    </p:extLst>
   </p:cSld>
   <p:clrMapOvr>
     <a:masterClrMapping/>
@@ -3599,8 +4634,8 @@
           </a:p>
         </p:txBody>
       </p:sp>
-      <mc:AlternateContent xmlns:mc="http://schemas.openxmlformats.org/markup-compatibility/2006" xmlns:a14="http://schemas.microsoft.com/office/drawing/2010/main">
-        <mc:Choice Requires="a14">
+      <mc:AlternateContent xmlns:mc="http://schemas.openxmlformats.org/markup-compatibility/2006">
+        <mc:Choice xmlns:a14="http://schemas.microsoft.com/office/drawing/2010/main" Requires="a14">
           <p:sp>
             <p:nvSpPr>
               <p:cNvPr id="3" name="Content Placeholder 2"/>
@@ -3611,10 +4646,15 @@
                 <p:ph idx="1"/>
               </p:nvPr>
             </p:nvSpPr>
-            <p:spPr/>
+            <p:spPr>
+              <a:xfrm>
+                <a:off x="457200" y="1200151"/>
+                <a:ext cx="8229600" cy="3770860"/>
+              </a:xfrm>
+            </p:spPr>
             <p:txBody>
               <a:bodyPr>
-                <a:normAutofit fontScale="70000" lnSpcReduction="20000"/>
+                <a:normAutofit fontScale="85000" lnSpcReduction="10000"/>
               </a:bodyPr>
               <a:lstStyle/>
               <a:p>
@@ -3622,13 +4662,15 @@
                   <a:buNone/>
                 </a:pPr>
                 <a:r>
+                  <a:rPr lang="en-US" dirty="0"/>
                   <a:t>How can we understand the AR model?</a:t>
                 </a:r>
               </a:p>
               <a:p>
                 <a:pPr lvl="0"/>
                 <a:r>
-                  <a:t>Model matrix of AR(2) model</a:t>
+                  <a:rPr lang="en-US" dirty="0"/>
+                  <a:t>Model matrix of AR(3) model</a:t>
                 </a:r>
               </a:p>
               <a:p>
@@ -3642,13 +4684,13 @@
                     </m:oMathParaPr>
                     <m:oMath xmlns:m="http://schemas.openxmlformats.org/officeDocument/2006/math">
                       <m:r>
-                        <a:rPr>
+                        <a:rPr lang="en-US">
                           <a:latin typeface="Cambria Math" panose="02040503050406030204" pitchFamily="18" charset="0"/>
                         </a:rPr>
                         <m:t>𝐴</m:t>
                       </m:r>
                       <m:r>
-                        <a:rPr>
+                        <a:rPr lang="en-US">
                           <a:latin typeface="Cambria Math" panose="02040503050406030204" pitchFamily="18" charset="0"/>
                         </a:rPr>
                         <m:t>=</m:t>
@@ -3658,7 +4700,7 @@
                           <m:begChr m:val="["/>
                           <m:endChr m:val="]"/>
                           <m:ctrlPr>
-                            <a:rPr i="1">
+                            <a:rPr lang="ar-AE" i="1">
                               <a:latin typeface="Cambria Math" panose="02040503050406030204" pitchFamily="18" charset="0"/>
                             </a:rPr>
                           </m:ctrlPr>
@@ -3675,7 +4717,7 @@
                                 </m:mc>
                               </m:mcs>
                               <m:ctrlPr>
-                                <a:rPr i="1">
+                                <a:rPr lang="ar-AE" i="1">
                                   <a:latin typeface="Cambria Math" panose="02040503050406030204" pitchFamily="18" charset="0"/>
                                 </a:rPr>
                               </m:ctrlPr>
@@ -3685,14 +4727,14 @@
                                 <m:sSub>
                                   <m:sSubPr>
                                     <m:ctrlPr>
-                                      <a:rPr i="1">
+                                      <a:rPr lang="ar-AE" i="1">
                                         <a:latin typeface="Cambria Math" panose="02040503050406030204" pitchFamily="18" charset="0"/>
                                       </a:rPr>
                                     </m:ctrlPr>
                                   </m:sSubPr>
                                   <m:e>
                                     <m:r>
-                                      <a:rPr>
+                                      <a:rPr lang="ar-AE">
                                         <a:latin typeface="Cambria Math" panose="02040503050406030204" pitchFamily="18" charset="0"/>
                                       </a:rPr>
                                       <m:t>𝑦</m:t>
@@ -3700,7 +4742,7 @@
                                   </m:e>
                                   <m:sub>
                                     <m:r>
-                                      <a:rPr>
+                                      <a:rPr lang="ar-AE">
                                         <a:latin typeface="Cambria Math" panose="02040503050406030204" pitchFamily="18" charset="0"/>
                                       </a:rPr>
                                       <m:t>𝑡</m:t>
@@ -3708,7 +4750,7 @@
                                   </m:sub>
                                 </m:sSub>
                                 <m:r>
-                                  <a:rPr>
+                                  <a:rPr lang="ar-AE">
                                     <a:latin typeface="Cambria Math" panose="02040503050406030204" pitchFamily="18" charset="0"/>
                                   </a:rPr>
                                   <m:t>, </m:t>
@@ -3716,14 +4758,14 @@
                                 <m:sSub>
                                   <m:sSubPr>
                                     <m:ctrlPr>
-                                      <a:rPr i="1">
+                                      <a:rPr lang="ar-AE" i="1">
                                         <a:latin typeface="Cambria Math" panose="02040503050406030204" pitchFamily="18" charset="0"/>
                                       </a:rPr>
                                     </m:ctrlPr>
                                   </m:sSubPr>
                                   <m:e>
                                     <m:r>
-                                      <a:rPr>
+                                      <a:rPr lang="ar-AE">
                                         <a:latin typeface="Cambria Math" panose="02040503050406030204" pitchFamily="18" charset="0"/>
                                       </a:rPr>
                                       <m:t>𝑦</m:t>
@@ -3731,19 +4773,19 @@
                                   </m:e>
                                   <m:sub>
                                     <m:r>
-                                      <a:rPr>
+                                      <a:rPr lang="ar-AE">
                                         <a:latin typeface="Cambria Math" panose="02040503050406030204" pitchFamily="18" charset="0"/>
                                       </a:rPr>
                                       <m:t>𝑡</m:t>
                                     </m:r>
                                     <m:r>
-                                      <a:rPr>
+                                      <a:rPr lang="ar-AE">
                                         <a:latin typeface="Cambria Math" panose="02040503050406030204" pitchFamily="18" charset="0"/>
                                       </a:rPr>
                                       <m:t>−</m:t>
                                     </m:r>
                                     <m:r>
-                                      <a:rPr>
+                                      <a:rPr lang="ar-AE">
                                         <a:latin typeface="Cambria Math" panose="02040503050406030204" pitchFamily="18" charset="0"/>
                                       </a:rPr>
                                       <m:t>1</m:t>
@@ -3751,7 +4793,7 @@
                                   </m:sub>
                                 </m:sSub>
                                 <m:r>
-                                  <a:rPr>
+                                  <a:rPr lang="ar-AE">
                                     <a:latin typeface="Cambria Math" panose="02040503050406030204" pitchFamily="18" charset="0"/>
                                   </a:rPr>
                                   <m:t>, </m:t>
@@ -3759,14 +4801,14 @@
                                 <m:sSub>
                                   <m:sSubPr>
                                     <m:ctrlPr>
-                                      <a:rPr i="1">
+                                      <a:rPr lang="ar-AE" i="1">
                                         <a:latin typeface="Cambria Math" panose="02040503050406030204" pitchFamily="18" charset="0"/>
                                       </a:rPr>
                                     </m:ctrlPr>
                                   </m:sSubPr>
                                   <m:e>
                                     <m:r>
-                                      <a:rPr>
+                                      <a:rPr lang="ar-AE">
                                         <a:latin typeface="Cambria Math" panose="02040503050406030204" pitchFamily="18" charset="0"/>
                                       </a:rPr>
                                       <m:t>𝑦</m:t>
@@ -3774,19 +4816,19 @@
                                   </m:e>
                                   <m:sub>
                                     <m:r>
-                                      <a:rPr>
+                                      <a:rPr lang="ar-AE">
                                         <a:latin typeface="Cambria Math" panose="02040503050406030204" pitchFamily="18" charset="0"/>
                                       </a:rPr>
                                       <m:t>𝑡</m:t>
                                     </m:r>
                                     <m:r>
-                                      <a:rPr>
+                                      <a:rPr lang="ar-AE">
                                         <a:latin typeface="Cambria Math" panose="02040503050406030204" pitchFamily="18" charset="0"/>
                                       </a:rPr>
                                       <m:t>−</m:t>
                                     </m:r>
                                     <m:r>
-                                      <a:rPr>
+                                      <a:rPr lang="ar-AE">
                                         <a:latin typeface="Cambria Math" panose="02040503050406030204" pitchFamily="18" charset="0"/>
                                       </a:rPr>
                                       <m:t>2</m:t>
@@ -3800,14 +4842,14 @@
                                 <m:sSub>
                                   <m:sSubPr>
                                     <m:ctrlPr>
-                                      <a:rPr i="1">
+                                      <a:rPr lang="ar-AE" i="1">
                                         <a:latin typeface="Cambria Math" panose="02040503050406030204" pitchFamily="18" charset="0"/>
                                       </a:rPr>
                                     </m:ctrlPr>
                                   </m:sSubPr>
                                   <m:e>
                                     <m:r>
-                                      <a:rPr>
+                                      <a:rPr lang="ar-AE">
                                         <a:latin typeface="Cambria Math" panose="02040503050406030204" pitchFamily="18" charset="0"/>
                                       </a:rPr>
                                       <m:t>𝑦</m:t>
@@ -3815,19 +4857,19 @@
                                   </m:e>
                                   <m:sub>
                                     <m:r>
-                                      <a:rPr>
+                                      <a:rPr lang="ar-AE">
                                         <a:latin typeface="Cambria Math" panose="02040503050406030204" pitchFamily="18" charset="0"/>
                                       </a:rPr>
                                       <m:t>𝑡</m:t>
                                     </m:r>
                                     <m:r>
-                                      <a:rPr>
+                                      <a:rPr lang="ar-AE">
                                         <a:latin typeface="Cambria Math" panose="02040503050406030204" pitchFamily="18" charset="0"/>
                                       </a:rPr>
                                       <m:t>−</m:t>
                                     </m:r>
                                     <m:r>
-                                      <a:rPr>
+                                      <a:rPr lang="ar-AE">
                                         <a:latin typeface="Cambria Math" panose="02040503050406030204" pitchFamily="18" charset="0"/>
                                       </a:rPr>
                                       <m:t>1</m:t>
@@ -3835,7 +4877,7 @@
                                   </m:sub>
                                 </m:sSub>
                                 <m:r>
-                                  <a:rPr>
+                                  <a:rPr lang="ar-AE">
                                     <a:latin typeface="Cambria Math" panose="02040503050406030204" pitchFamily="18" charset="0"/>
                                   </a:rPr>
                                   <m:t>, </m:t>
@@ -3843,14 +4885,14 @@
                                 <m:sSub>
                                   <m:sSubPr>
                                     <m:ctrlPr>
-                                      <a:rPr i="1">
+                                      <a:rPr lang="ar-AE" i="1">
                                         <a:latin typeface="Cambria Math" panose="02040503050406030204" pitchFamily="18" charset="0"/>
                                       </a:rPr>
                                     </m:ctrlPr>
                                   </m:sSubPr>
                                   <m:e>
                                     <m:r>
-                                      <a:rPr>
+                                      <a:rPr lang="ar-AE">
                                         <a:latin typeface="Cambria Math" panose="02040503050406030204" pitchFamily="18" charset="0"/>
                                       </a:rPr>
                                       <m:t>𝑦</m:t>
@@ -3858,19 +4900,19 @@
                                   </m:e>
                                   <m:sub>
                                     <m:r>
-                                      <a:rPr>
+                                      <a:rPr lang="ar-AE">
                                         <a:latin typeface="Cambria Math" panose="02040503050406030204" pitchFamily="18" charset="0"/>
                                       </a:rPr>
                                       <m:t>𝑡</m:t>
                                     </m:r>
                                     <m:r>
-                                      <a:rPr>
+                                      <a:rPr lang="ar-AE">
                                         <a:latin typeface="Cambria Math" panose="02040503050406030204" pitchFamily="18" charset="0"/>
                                       </a:rPr>
                                       <m:t>−</m:t>
                                     </m:r>
                                     <m:r>
-                                      <a:rPr>
+                                      <a:rPr lang="ar-AE">
                                         <a:latin typeface="Cambria Math" panose="02040503050406030204" pitchFamily="18" charset="0"/>
                                       </a:rPr>
                                       <m:t>2</m:t>
@@ -3878,7 +4920,7 @@
                                   </m:sub>
                                 </m:sSub>
                                 <m:r>
-                                  <a:rPr>
+                                  <a:rPr lang="ar-AE">
                                     <a:latin typeface="Cambria Math" panose="02040503050406030204" pitchFamily="18" charset="0"/>
                                   </a:rPr>
                                   <m:t>, </m:t>
@@ -3886,14 +4928,14 @@
                                 <m:sSub>
                                   <m:sSubPr>
                                     <m:ctrlPr>
-                                      <a:rPr i="1">
+                                      <a:rPr lang="ar-AE" i="1">
                                         <a:latin typeface="Cambria Math" panose="02040503050406030204" pitchFamily="18" charset="0"/>
                                       </a:rPr>
                                     </m:ctrlPr>
                                   </m:sSubPr>
                                   <m:e>
                                     <m:r>
-                                      <a:rPr>
+                                      <a:rPr lang="ar-AE">
                                         <a:latin typeface="Cambria Math" panose="02040503050406030204" pitchFamily="18" charset="0"/>
                                       </a:rPr>
                                       <m:t>𝑦</m:t>
@@ -3901,19 +4943,19 @@
                                   </m:e>
                                   <m:sub>
                                     <m:r>
-                                      <a:rPr>
+                                      <a:rPr lang="ar-AE">
                                         <a:latin typeface="Cambria Math" panose="02040503050406030204" pitchFamily="18" charset="0"/>
                                       </a:rPr>
                                       <m:t>𝑡</m:t>
                                     </m:r>
                                     <m:r>
-                                      <a:rPr>
+                                      <a:rPr lang="ar-AE">
                                         <a:latin typeface="Cambria Math" panose="02040503050406030204" pitchFamily="18" charset="0"/>
                                       </a:rPr>
                                       <m:t>−</m:t>
                                     </m:r>
                                     <m:r>
-                                      <a:rPr>
+                                      <a:rPr lang="ar-AE">
                                         <a:latin typeface="Cambria Math" panose="02040503050406030204" pitchFamily="18" charset="0"/>
                                       </a:rPr>
                                       <m:t>3</m:t>
@@ -3927,14 +4969,14 @@
                                 <m:sSub>
                                   <m:sSubPr>
                                     <m:ctrlPr>
-                                      <a:rPr i="1">
+                                      <a:rPr lang="ar-AE" i="1">
                                         <a:latin typeface="Cambria Math" panose="02040503050406030204" pitchFamily="18" charset="0"/>
                                       </a:rPr>
                                     </m:ctrlPr>
                                   </m:sSubPr>
                                   <m:e>
                                     <m:r>
-                                      <a:rPr>
+                                      <a:rPr lang="ar-AE">
                                         <a:latin typeface="Cambria Math" panose="02040503050406030204" pitchFamily="18" charset="0"/>
                                       </a:rPr>
                                       <m:t>𝑦</m:t>
@@ -3942,19 +4984,19 @@
                                   </m:e>
                                   <m:sub>
                                     <m:r>
-                                      <a:rPr>
+                                      <a:rPr lang="ar-AE">
                                         <a:latin typeface="Cambria Math" panose="02040503050406030204" pitchFamily="18" charset="0"/>
                                       </a:rPr>
                                       <m:t>𝑡</m:t>
                                     </m:r>
                                     <m:r>
-                                      <a:rPr>
+                                      <a:rPr lang="ar-AE">
                                         <a:latin typeface="Cambria Math" panose="02040503050406030204" pitchFamily="18" charset="0"/>
                                       </a:rPr>
                                       <m:t>−</m:t>
                                     </m:r>
                                     <m:r>
-                                      <a:rPr>
+                                      <a:rPr lang="ar-AE">
                                         <a:latin typeface="Cambria Math" panose="02040503050406030204" pitchFamily="18" charset="0"/>
                                       </a:rPr>
                                       <m:t>2</m:t>
@@ -3962,7 +5004,7 @@
                                   </m:sub>
                                 </m:sSub>
                                 <m:r>
-                                  <a:rPr>
+                                  <a:rPr lang="ar-AE">
                                     <a:latin typeface="Cambria Math" panose="02040503050406030204" pitchFamily="18" charset="0"/>
                                   </a:rPr>
                                   <m:t>, </m:t>
@@ -3970,14 +5012,14 @@
                                 <m:sSub>
                                   <m:sSubPr>
                                     <m:ctrlPr>
-                                      <a:rPr i="1">
+                                      <a:rPr lang="ar-AE" i="1">
                                         <a:latin typeface="Cambria Math" panose="02040503050406030204" pitchFamily="18" charset="0"/>
                                       </a:rPr>
                                     </m:ctrlPr>
                                   </m:sSubPr>
                                   <m:e>
                                     <m:r>
-                                      <a:rPr>
+                                      <a:rPr lang="ar-AE">
                                         <a:latin typeface="Cambria Math" panose="02040503050406030204" pitchFamily="18" charset="0"/>
                                       </a:rPr>
                                       <m:t>𝑦</m:t>
@@ -3985,19 +5027,19 @@
                                   </m:e>
                                   <m:sub>
                                     <m:r>
-                                      <a:rPr>
+                                      <a:rPr lang="ar-AE">
                                         <a:latin typeface="Cambria Math" panose="02040503050406030204" pitchFamily="18" charset="0"/>
                                       </a:rPr>
                                       <m:t>𝑡</m:t>
                                     </m:r>
                                     <m:r>
-                                      <a:rPr>
+                                      <a:rPr lang="ar-AE">
                                         <a:latin typeface="Cambria Math" panose="02040503050406030204" pitchFamily="18" charset="0"/>
                                       </a:rPr>
                                       <m:t>−</m:t>
                                     </m:r>
                                     <m:r>
-                                      <a:rPr>
+                                      <a:rPr lang="ar-AE">
                                         <a:latin typeface="Cambria Math" panose="02040503050406030204" pitchFamily="18" charset="0"/>
                                       </a:rPr>
                                       <m:t>3</m:t>
@@ -4005,7 +5047,7 @@
                                   </m:sub>
                                 </m:sSub>
                                 <m:r>
-                                  <a:rPr>
+                                  <a:rPr lang="ar-AE">
                                     <a:latin typeface="Cambria Math" panose="02040503050406030204" pitchFamily="18" charset="0"/>
                                   </a:rPr>
                                   <m:t>, </m:t>
@@ -4013,14 +5055,14 @@
                                 <m:sSub>
                                   <m:sSubPr>
                                     <m:ctrlPr>
-                                      <a:rPr i="1">
+                                      <a:rPr lang="ar-AE" i="1">
                                         <a:latin typeface="Cambria Math" panose="02040503050406030204" pitchFamily="18" charset="0"/>
                                       </a:rPr>
                                     </m:ctrlPr>
                                   </m:sSubPr>
                                   <m:e>
                                     <m:r>
-                                      <a:rPr>
+                                      <a:rPr lang="ar-AE">
                                         <a:latin typeface="Cambria Math" panose="02040503050406030204" pitchFamily="18" charset="0"/>
                                       </a:rPr>
                                       <m:t>𝑦</m:t>
@@ -4028,19 +5070,19 @@
                                   </m:e>
                                   <m:sub>
                                     <m:r>
-                                      <a:rPr>
+                                      <a:rPr lang="ar-AE">
                                         <a:latin typeface="Cambria Math" panose="02040503050406030204" pitchFamily="18" charset="0"/>
                                       </a:rPr>
                                       <m:t>𝑡</m:t>
                                     </m:r>
                                     <m:r>
-                                      <a:rPr>
+                                      <a:rPr lang="ar-AE">
                                         <a:latin typeface="Cambria Math" panose="02040503050406030204" pitchFamily="18" charset="0"/>
                                       </a:rPr>
                                       <m:t>−</m:t>
                                     </m:r>
                                     <m:r>
-                                      <a:rPr>
+                                      <a:rPr lang="ar-AE">
                                         <a:latin typeface="Cambria Math" panose="02040503050406030204" pitchFamily="18" charset="0"/>
                                       </a:rPr>
                                       <m:t>4</m:t>
@@ -4052,7 +5094,7 @@
                             <m:mr>
                               <m:e>
                                 <m:r>
-                                  <a:rPr>
+                                  <a:rPr lang="ar-AE">
                                     <a:latin typeface="Cambria Math" panose="02040503050406030204" pitchFamily="18" charset="0"/>
                                   </a:rPr>
                                   <m:t>⋮,     ⋮,     ⋮</m:t>
@@ -4064,14 +5106,14 @@
                                 <m:sSub>
                                   <m:sSubPr>
                                     <m:ctrlPr>
-                                      <a:rPr i="1">
+                                      <a:rPr lang="ar-AE" i="1">
                                         <a:latin typeface="Cambria Math" panose="02040503050406030204" pitchFamily="18" charset="0"/>
                                       </a:rPr>
                                     </m:ctrlPr>
                                   </m:sSubPr>
                                   <m:e>
                                     <m:r>
-                                      <a:rPr>
+                                      <a:rPr lang="ar-AE">
                                         <a:latin typeface="Cambria Math" panose="02040503050406030204" pitchFamily="18" charset="0"/>
                                       </a:rPr>
                                       <m:t>𝑦</m:t>
@@ -4079,7 +5121,7 @@
                                   </m:e>
                                   <m:sub>
                                     <m:r>
-                                      <a:rPr>
+                                      <a:rPr lang="ar-AE">
                                         <a:latin typeface="Cambria Math" panose="02040503050406030204" pitchFamily="18" charset="0"/>
                                       </a:rPr>
                                       <m:t>2</m:t>
@@ -4087,7 +5129,7 @@
                                   </m:sub>
                                 </m:sSub>
                                 <m:r>
-                                  <a:rPr>
+                                  <a:rPr lang="ar-AE">
                                     <a:latin typeface="Cambria Math" panose="02040503050406030204" pitchFamily="18" charset="0"/>
                                   </a:rPr>
                                   <m:t>,    </m:t>
@@ -4095,14 +5137,14 @@
                                 <m:sSub>
                                   <m:sSubPr>
                                     <m:ctrlPr>
-                                      <a:rPr i="1">
+                                      <a:rPr lang="ar-AE" i="1">
                                         <a:latin typeface="Cambria Math" panose="02040503050406030204" pitchFamily="18" charset="0"/>
                                       </a:rPr>
                                     </m:ctrlPr>
                                   </m:sSubPr>
                                   <m:e>
                                     <m:r>
-                                      <a:rPr>
+                                      <a:rPr lang="ar-AE">
                                         <a:latin typeface="Cambria Math" panose="02040503050406030204" pitchFamily="18" charset="0"/>
                                       </a:rPr>
                                       <m:t>𝑦</m:t>
@@ -4110,7 +5152,7 @@
                                   </m:e>
                                   <m:sub>
                                     <m:r>
-                                      <a:rPr>
+                                      <a:rPr lang="ar-AE">
                                         <a:latin typeface="Cambria Math" panose="02040503050406030204" pitchFamily="18" charset="0"/>
                                       </a:rPr>
                                       <m:t>1</m:t>
@@ -4118,7 +5160,7 @@
                                   </m:sub>
                                 </m:sSub>
                                 <m:r>
-                                  <a:rPr>
+                                  <a:rPr lang="ar-AE">
                                     <a:latin typeface="Cambria Math" panose="02040503050406030204" pitchFamily="18" charset="0"/>
                                   </a:rPr>
                                   <m:t>,    </m:t>
@@ -4126,14 +5168,14 @@
                                 <m:sSub>
                                   <m:sSubPr>
                                     <m:ctrlPr>
-                                      <a:rPr i="1">
+                                      <a:rPr lang="ar-AE" i="1">
                                         <a:latin typeface="Cambria Math" panose="02040503050406030204" pitchFamily="18" charset="0"/>
                                       </a:rPr>
                                     </m:ctrlPr>
                                   </m:sSubPr>
                                   <m:e>
                                     <m:r>
-                                      <a:rPr>
+                                      <a:rPr lang="ar-AE">
                                         <a:latin typeface="Cambria Math" panose="02040503050406030204" pitchFamily="18" charset="0"/>
                                       </a:rPr>
                                       <m:t>𝑦</m:t>
@@ -4141,7 +5183,7 @@
                                   </m:e>
                                   <m:sub>
                                     <m:r>
-                                      <a:rPr>
+                                      <a:rPr lang="ar-AE">
                                         <a:latin typeface="Cambria Math" panose="02040503050406030204" pitchFamily="18" charset="0"/>
                                       </a:rPr>
                                       <m:t>0</m:t>
@@ -4155,14 +5197,14 @@
                                 <m:sSub>
                                   <m:sSubPr>
                                     <m:ctrlPr>
-                                      <a:rPr i="1">
+                                      <a:rPr lang="ar-AE" i="1">
                                         <a:latin typeface="Cambria Math" panose="02040503050406030204" pitchFamily="18" charset="0"/>
                                       </a:rPr>
                                     </m:ctrlPr>
                                   </m:sSubPr>
                                   <m:e>
                                     <m:r>
-                                      <a:rPr>
+                                      <a:rPr lang="ar-AE">
                                         <a:latin typeface="Cambria Math" panose="02040503050406030204" pitchFamily="18" charset="0"/>
                                       </a:rPr>
                                       <m:t>𝑦</m:t>
@@ -4170,7 +5212,7 @@
                                   </m:e>
                                   <m:sub>
                                     <m:r>
-                                      <a:rPr>
+                                      <a:rPr lang="ar-AE">
                                         <a:latin typeface="Cambria Math" panose="02040503050406030204" pitchFamily="18" charset="0"/>
                                       </a:rPr>
                                       <m:t>1</m:t>
@@ -4178,7 +5220,7 @@
                                   </m:sub>
                                 </m:sSub>
                                 <m:r>
-                                  <a:rPr>
+                                  <a:rPr lang="ar-AE">
                                     <a:latin typeface="Cambria Math" panose="02040503050406030204" pitchFamily="18" charset="0"/>
                                   </a:rPr>
                                   <m:t>,    </m:t>
@@ -4186,14 +5228,14 @@
                                 <m:sSub>
                                   <m:sSubPr>
                                     <m:ctrlPr>
-                                      <a:rPr i="1">
+                                      <a:rPr lang="ar-AE" i="1">
                                         <a:latin typeface="Cambria Math" panose="02040503050406030204" pitchFamily="18" charset="0"/>
                                       </a:rPr>
                                     </m:ctrlPr>
                                   </m:sSubPr>
                                   <m:e>
                                     <m:r>
-                                      <a:rPr>
+                                      <a:rPr lang="ar-AE">
                                         <a:latin typeface="Cambria Math" panose="02040503050406030204" pitchFamily="18" charset="0"/>
                                       </a:rPr>
                                       <m:t>𝑦</m:t>
@@ -4201,7 +5243,7 @@
                                   </m:e>
                                   <m:sub>
                                     <m:r>
-                                      <a:rPr>
+                                      <a:rPr lang="ar-AE">
                                         <a:latin typeface="Cambria Math" panose="02040503050406030204" pitchFamily="18" charset="0"/>
                                       </a:rPr>
                                       <m:t>0</m:t>
@@ -4209,13 +5251,13 @@
                                   </m:sub>
                                 </m:sSub>
                                 <m:r>
-                                  <a:rPr>
+                                  <a:rPr lang="ar-AE">
                                     <a:latin typeface="Cambria Math" panose="02040503050406030204" pitchFamily="18" charset="0"/>
                                   </a:rPr>
                                   <m:t>    </m:t>
                                 </m:r>
                                 <m:r>
-                                  <a:rPr>
+                                  <a:rPr lang="ar-AE">
                                     <a:latin typeface="Cambria Math" panose="02040503050406030204" pitchFamily="18" charset="0"/>
                                   </a:rPr>
                                   <m:t>0</m:t>
@@ -4227,14 +5269,14 @@
                                 <m:sSub>
                                   <m:sSubPr>
                                     <m:ctrlPr>
-                                      <a:rPr i="1">
+                                      <a:rPr lang="ar-AE" i="1">
                                         <a:latin typeface="Cambria Math" panose="02040503050406030204" pitchFamily="18" charset="0"/>
                                       </a:rPr>
                                     </m:ctrlPr>
                                   </m:sSubPr>
                                   <m:e>
                                     <m:r>
-                                      <a:rPr>
+                                      <a:rPr lang="ar-AE">
                                         <a:latin typeface="Cambria Math" panose="02040503050406030204" pitchFamily="18" charset="0"/>
                                       </a:rPr>
                                       <m:t>𝑦</m:t>
@@ -4242,7 +5284,7 @@
                                   </m:e>
                                   <m:sub>
                                     <m:r>
-                                      <a:rPr>
+                                      <a:rPr lang="ar-AE">
                                         <a:latin typeface="Cambria Math" panose="02040503050406030204" pitchFamily="18" charset="0"/>
                                       </a:rPr>
                                       <m:t>0</m:t>
@@ -4250,25 +5292,25 @@
                                   </m:sub>
                                 </m:sSub>
                                 <m:r>
-                                  <a:rPr>
+                                  <a:rPr lang="ar-AE">
                                     <a:latin typeface="Cambria Math" panose="02040503050406030204" pitchFamily="18" charset="0"/>
                                   </a:rPr>
                                   <m:t>,    </m:t>
                                 </m:r>
                                 <m:r>
-                                  <a:rPr>
+                                  <a:rPr lang="ar-AE">
                                     <a:latin typeface="Cambria Math" panose="02040503050406030204" pitchFamily="18" charset="0"/>
                                   </a:rPr>
                                   <m:t>0</m:t>
                                 </m:r>
                                 <m:r>
-                                  <a:rPr>
+                                  <a:rPr lang="ar-AE">
                                     <a:latin typeface="Cambria Math" panose="02040503050406030204" pitchFamily="18" charset="0"/>
                                   </a:rPr>
                                   <m:t>,    </m:t>
                                 </m:r>
                                 <m:r>
-                                  <a:rPr>
+                                  <a:rPr lang="ar-AE">
                                     <a:latin typeface="Cambria Math" panose="02040503050406030204" pitchFamily="18" charset="0"/>
                                   </a:rPr>
                                   <m:t>0</m:t>
@@ -4281,33 +5323,35 @@
                     </m:oMath>
                   </m:oMathPara>
                 </a14:m>
-                <a:endParaRPr/>
+                <a:endParaRPr lang="ar-AE" dirty="0"/>
               </a:p>
               <a:p>
                 <a:pPr lvl="0"/>
                 <a:r>
+                  <a:rPr lang="en-US" dirty="0"/>
                   <a:t>AR model is a </a:t>
                 </a:r>
                 <a:r>
-                  <a:rPr b="1"/>
+                  <a:rPr lang="en-US" b="1" dirty="0"/>
                   <a:t>linear model!</a:t>
                 </a:r>
               </a:p>
               <a:p>
                 <a:pPr lvl="0"/>
                 <a:r>
+                  <a:rPr lang="en-US" dirty="0"/>
                   <a:t>For coefficient vector, </a:t>
                 </a:r>
                 <a14:m>
                   <m:oMath xmlns:m="http://schemas.openxmlformats.org/officeDocument/2006/math">
                     <m:r>
-                      <a:rPr>
+                      <a:rPr lang="en-US">
                         <a:latin typeface="Cambria Math" panose="02040503050406030204" pitchFamily="18" charset="0"/>
                       </a:rPr>
                       <m:t>𝛷</m:t>
                     </m:r>
                     <m:r>
-                      <a:rPr>
+                      <a:rPr lang="en-US">
                         <a:latin typeface="Cambria Math" panose="02040503050406030204" pitchFamily="18" charset="0"/>
                       </a:rPr>
                       <m:t>=</m:t>
@@ -4317,7 +5361,7 @@
                         <m:begChr m:val="["/>
                         <m:endChr m:val="]"/>
                         <m:ctrlPr>
-                          <a:rPr i="1">
+                          <a:rPr lang="ar-AE" i="1">
                             <a:latin typeface="Cambria Math" panose="02040503050406030204" pitchFamily="18" charset="0"/>
                           </a:rPr>
                         </m:ctrlPr>
@@ -4326,14 +5370,14 @@
                         <m:sSub>
                           <m:sSubPr>
                             <m:ctrlPr>
-                              <a:rPr i="1">
+                              <a:rPr lang="ar-AE" i="1">
                                 <a:latin typeface="Cambria Math" panose="02040503050406030204" pitchFamily="18" charset="0"/>
                               </a:rPr>
                             </m:ctrlPr>
                           </m:sSubPr>
                           <m:e>
                             <m:r>
-                              <a:rPr>
+                              <a:rPr lang="ar-AE">
                                 <a:latin typeface="Cambria Math" panose="02040503050406030204" pitchFamily="18" charset="0"/>
                               </a:rPr>
                               <m:t>𝜙</m:t>
@@ -4341,7 +5385,7 @@
                           </m:e>
                           <m:sub>
                             <m:r>
-                              <a:rPr>
+                              <a:rPr lang="ar-AE">
                                 <a:latin typeface="Cambria Math" panose="02040503050406030204" pitchFamily="18" charset="0"/>
                               </a:rPr>
                               <m:t>1</m:t>
@@ -4349,7 +5393,7 @@
                           </m:sub>
                         </m:sSub>
                         <m:r>
-                          <a:rPr>
+                          <a:rPr lang="ar-AE">
                             <a:latin typeface="Cambria Math" panose="02040503050406030204" pitchFamily="18" charset="0"/>
                           </a:rPr>
                           <m:t>,</m:t>
@@ -4357,14 +5401,14 @@
                         <m:sSub>
                           <m:sSubPr>
                             <m:ctrlPr>
-                              <a:rPr i="1">
+                              <a:rPr lang="ar-AE" i="1">
                                 <a:latin typeface="Cambria Math" panose="02040503050406030204" pitchFamily="18" charset="0"/>
                               </a:rPr>
                             </m:ctrlPr>
                           </m:sSubPr>
                           <m:e>
                             <m:r>
-                              <a:rPr>
+                              <a:rPr lang="ar-AE">
                                 <a:latin typeface="Cambria Math" panose="02040503050406030204" pitchFamily="18" charset="0"/>
                               </a:rPr>
                               <m:t>𝜙</m:t>
@@ -4372,7 +5416,7 @@
                           </m:e>
                           <m:sub>
                             <m:r>
-                              <a:rPr>
+                              <a:rPr lang="ar-AE">
                                 <a:latin typeface="Cambria Math" panose="02040503050406030204" pitchFamily="18" charset="0"/>
                               </a:rPr>
                               <m:t>2</m:t>
@@ -4380,22 +5424,22 @@
                           </m:sub>
                         </m:sSub>
                         <m:r>
-                          <a:rPr>
+                          <a:rPr lang="ar-AE" b="0" i="0" smtClean="0">
                             <a:latin typeface="Cambria Math" panose="02040503050406030204" pitchFamily="18" charset="0"/>
                           </a:rPr>
-                          <m:t>,…,</m:t>
+                          <m:t>,</m:t>
                         </m:r>
                         <m:sSub>
                           <m:sSubPr>
                             <m:ctrlPr>
-                              <a:rPr i="1">
+                              <a:rPr lang="ar-AE" i="1">
                                 <a:latin typeface="Cambria Math" panose="02040503050406030204" pitchFamily="18" charset="0"/>
                               </a:rPr>
                             </m:ctrlPr>
                           </m:sSubPr>
                           <m:e>
                             <m:r>
-                              <a:rPr>
+                              <a:rPr lang="ar-AE">
                                 <a:latin typeface="Cambria Math" panose="02040503050406030204" pitchFamily="18" charset="0"/>
                               </a:rPr>
                               <m:t>𝜙</m:t>
@@ -4403,10 +5447,10 @@
                           </m:e>
                           <m:sub>
                             <m:r>
-                              <a:rPr>
+                              <a:rPr lang="en-US" b="0" i="1" smtClean="0">
                                 <a:latin typeface="Cambria Math" panose="02040503050406030204" pitchFamily="18" charset="0"/>
                               </a:rPr>
-                              <m:t>𝑝</m:t>
+                              <m:t>3</m:t>
                             </m:r>
                           </m:sub>
                         </m:sSub>
@@ -4415,7 +5459,12 @@
                   </m:oMath>
                 </a14:m>
                 <a:r>
-                  <a:t>, solve linear system:</a:t>
+                  <a:rPr lang="ar-AE" dirty="0"/>
+                  <a:t>, </a:t>
+                </a:r>
+                <a:r>
+                  <a:rPr lang="en-US" dirty="0"/>
+                  <a:t>solve linear system:</a:t>
                 </a:r>
               </a:p>
               <a:p>
@@ -4429,25 +5478,25 @@
                     </m:oMathParaPr>
                     <m:oMath xmlns:m="http://schemas.openxmlformats.org/officeDocument/2006/math">
                       <m:r>
-                        <a:rPr>
+                        <a:rPr lang="en-US">
                           <a:latin typeface="Cambria Math" panose="02040503050406030204" pitchFamily="18" charset="0"/>
                         </a:rPr>
                         <m:t>𝑌</m:t>
                       </m:r>
                       <m:r>
-                        <a:rPr>
+                        <a:rPr lang="en-US">
                           <a:latin typeface="Cambria Math" panose="02040503050406030204" pitchFamily="18" charset="0"/>
                         </a:rPr>
                         <m:t>=</m:t>
                       </m:r>
                       <m:r>
-                        <a:rPr>
+                        <a:rPr lang="en-US">
                           <a:latin typeface="Cambria Math" panose="02040503050406030204" pitchFamily="18" charset="0"/>
                         </a:rPr>
                         <m:t>𝐴</m:t>
                       </m:r>
                       <m:r>
-                        <a:rPr>
+                        <a:rPr lang="en-US">
                           <a:latin typeface="Cambria Math" panose="02040503050406030204" pitchFamily="18" charset="0"/>
                         </a:rPr>
                         <m:t>𝛷</m:t>
@@ -4455,12 +5504,12 @@
                     </m:oMath>
                   </m:oMathPara>
                 </a14:m>
-                <a:endParaRPr/>
+                <a:endParaRPr dirty="0"/>
               </a:p>
             </p:txBody>
           </p:sp>
         </mc:Choice>
-        <mc:Fallback xmlns="">
+        <mc:Fallback>
           <p:sp>
             <p:nvSpPr>
               <p:cNvPr id="3" name="Content Placeholder 2"/>
@@ -4472,10 +5521,14 @@
               </p:nvPr>
             </p:nvSpPr>
             <p:spPr>
+              <a:xfrm>
+                <a:off x="457200" y="1200151"/>
+                <a:ext cx="8229600" cy="3770860"/>
+              </a:xfrm>
               <a:blipFill>
                 <a:blip r:embed="rId2"/>
                 <a:stretch>
-                  <a:fillRect l="-444" t="-1975"/>
+                  <a:fillRect l="-741" t="-1780"/>
                 </a:stretch>
               </a:blipFill>
             </p:spPr>
@@ -4543,8 +5596,8 @@
           </a:p>
         </p:txBody>
       </p:sp>
-      <mc:AlternateContent xmlns:mc="http://schemas.openxmlformats.org/markup-compatibility/2006">
-        <mc:Choice xmlns:a14="http://schemas.microsoft.com/office/drawing/2010/main" Requires="a14">
+      <mc:AlternateContent xmlns:mc="http://schemas.openxmlformats.org/markup-compatibility/2006" xmlns:a14="http://schemas.microsoft.com/office/drawing/2010/main">
+        <mc:Choice Requires="a14">
           <p:sp>
             <p:nvSpPr>
               <p:cNvPr id="3" name="Content Placeholder 2"/>
@@ -4684,7 +5737,13 @@
                                 <a:rPr lang="en-US" b="0" i="1" smtClean="0">
                                   <a:latin typeface="Cambria Math" panose="02040503050406030204" pitchFamily="18" charset="0"/>
                                 </a:rPr>
-                                <m:t>−1</m:t>
+                                <m:t>−</m:t>
+                              </m:r>
+                              <m:r>
+                                <a:rPr lang="en-US" b="0" i="1" smtClean="0">
+                                  <a:latin typeface="Cambria Math" panose="02040503050406030204" pitchFamily="18" charset="0"/>
+                                </a:rPr>
+                                <m:t>1</m:t>
                               </m:r>
                             </m:sub>
                           </m:sSub>
@@ -4824,7 +5883,14 @@
                           <a:latin typeface="Cambria Math" panose="02040503050406030204" pitchFamily="18" charset="0"/>
                           <a:ea typeface="Cambria Math" panose="02040503050406030204" pitchFamily="18" charset="0"/>
                         </a:rPr>
-                        <m:t>+0</m:t>
+                        <m:t>+</m:t>
+                      </m:r>
+                      <m:r>
+                        <a:rPr lang="en-US" b="0" i="0" smtClean="0">
+                          <a:latin typeface="Cambria Math" panose="02040503050406030204" pitchFamily="18" charset="0"/>
+                          <a:ea typeface="Cambria Math" panose="02040503050406030204" pitchFamily="18" charset="0"/>
+                        </a:rPr>
+                        <m:t>0</m:t>
                       </m:r>
                     </m:oMath>
                   </m:oMathPara>
@@ -4901,7 +5967,14 @@
                               <a:latin typeface="Cambria Math" panose="02040503050406030204" pitchFamily="18" charset="0"/>
                               <a:ea typeface="Cambria Math" panose="02040503050406030204" pitchFamily="18" charset="0"/>
                             </a:rPr>
-                            <m:t>1−</m:t>
+                            <m:t>1</m:t>
+                          </m:r>
+                          <m:r>
+                            <a:rPr lang="en-US" b="0" i="1" smtClean="0">
+                              <a:latin typeface="Cambria Math" panose="02040503050406030204" pitchFamily="18" charset="0"/>
+                              <a:ea typeface="Cambria Math" panose="02040503050406030204" pitchFamily="18" charset="0"/>
+                            </a:rPr>
+                            <m:t>−</m:t>
                           </m:r>
                           <m:r>
                             <a:rPr lang="en-US" i="1">
@@ -4959,7 +6032,13 @@
                         <a:rPr lang="en-US">
                           <a:latin typeface="Cambria Math" panose="02040503050406030204" pitchFamily="18" charset="0"/>
                         </a:rPr>
-                        <m:t>1−</m:t>
+                        <m:t>1</m:t>
+                      </m:r>
+                      <m:r>
+                        <a:rPr lang="en-US">
+                          <a:latin typeface="Cambria Math" panose="02040503050406030204" pitchFamily="18" charset="0"/>
+                        </a:rPr>
+                        <m:t>−</m:t>
                       </m:r>
                       <m:r>
                         <a:rPr lang="en-US" i="1">
@@ -4992,7 +6071,13 @@
                       <a:rPr lang="en-US">
                         <a:latin typeface="Cambria Math" panose="02040503050406030204" pitchFamily="18" charset="0"/>
                       </a:rPr>
-                      <m:t>&lt;1</m:t>
+                      <m:t>&lt;</m:t>
+                    </m:r>
+                    <m:r>
+                      <a:rPr lang="en-US">
+                        <a:latin typeface="Cambria Math" panose="02040503050406030204" pitchFamily="18" charset="0"/>
+                      </a:rPr>
+                      <m:t>1</m:t>
                     </m:r>
                   </m:oMath>
                 </a14:m>
@@ -5154,7 +6239,7 @@
             </p:txBody>
           </p:sp>
         </mc:Choice>
-        <mc:Fallback>
+        <mc:Fallback xmlns="">
           <p:sp>
             <p:nvSpPr>
               <p:cNvPr id="3" name="Content Placeholder 2"/>
@@ -5751,8 +6836,8 @@
           </a:p>
         </p:txBody>
       </p:sp>
-      <mc:AlternateContent xmlns:mc="http://schemas.openxmlformats.org/markup-compatibility/2006">
-        <mc:Choice xmlns:a14="http://schemas.microsoft.com/office/drawing/2010/main" Requires="a14">
+      <mc:AlternateContent xmlns:mc="http://schemas.openxmlformats.org/markup-compatibility/2006" xmlns:a14="http://schemas.microsoft.com/office/drawing/2010/main">
+        <mc:Choice Requires="a14">
           <p:sp>
             <p:nvSpPr>
               <p:cNvPr id="3" name="Content Placeholder 2"/>
@@ -5982,7 +7067,7 @@
             </p:txBody>
           </p:sp>
         </mc:Choice>
-        <mc:Fallback>
+        <mc:Fallback xmlns="">
           <p:sp>
             <p:nvSpPr>
               <p:cNvPr id="3" name="Content Placeholder 2"/>
@@ -6065,8 +7150,8 @@
           </a:p>
         </p:txBody>
       </p:sp>
-      <mc:AlternateContent xmlns:mc="http://schemas.openxmlformats.org/markup-compatibility/2006">
-        <mc:Choice xmlns:a14="http://schemas.microsoft.com/office/drawing/2010/main" Requires="a14">
+      <mc:AlternateContent xmlns:mc="http://schemas.openxmlformats.org/markup-compatibility/2006" xmlns:a14="http://schemas.microsoft.com/office/drawing/2010/main">
+        <mc:Choice Requires="a14">
           <p:sp>
             <p:nvSpPr>
               <p:cNvPr id="3" name="Content Placeholder 2"/>
@@ -6986,7 +8071,7 @@
             </p:txBody>
           </p:sp>
         </mc:Choice>
-        <mc:Fallback>
+        <mc:Fallback xmlns="">
           <p:sp>
             <p:nvSpPr>
               <p:cNvPr id="3" name="Content Placeholder 2"/>
@@ -8643,8 +9728,8 @@
           </a:p>
         </p:txBody>
       </p:sp>
-      <mc:AlternateContent xmlns:mc="http://schemas.openxmlformats.org/markup-compatibility/2006">
-        <mc:Choice xmlns:a14="http://schemas.microsoft.com/office/drawing/2010/main" Requires="a14">
+      <mc:AlternateContent xmlns:mc="http://schemas.openxmlformats.org/markup-compatibility/2006" xmlns:a14="http://schemas.microsoft.com/office/drawing/2010/main">
+        <mc:Choice Requires="a14">
           <p:sp>
             <p:nvSpPr>
               <p:cNvPr id="3" name="Content Placeholder 2"/>
@@ -10056,7 +11141,7 @@
             </p:txBody>
           </p:sp>
         </mc:Choice>
-        <mc:Fallback>
+        <mc:Fallback xmlns="">
           <p:sp>
             <p:nvSpPr>
               <p:cNvPr id="3" name="Content Placeholder 2"/>
@@ -10395,8 +11480,8 @@
           </a:p>
         </p:txBody>
       </p:sp>
-      <mc:AlternateContent xmlns:mc="http://schemas.openxmlformats.org/markup-compatibility/2006">
-        <mc:Choice xmlns:a14="http://schemas.microsoft.com/office/drawing/2010/main" Requires="a14">
+      <mc:AlternateContent xmlns:mc="http://schemas.openxmlformats.org/markup-compatibility/2006" xmlns:a14="http://schemas.microsoft.com/office/drawing/2010/main">
+        <mc:Choice Requires="a14">
           <p:sp>
             <p:nvSpPr>
               <p:cNvPr id="3" name="Content Placeholder 2"/>
@@ -11223,7 +12308,7 @@
             </p:txBody>
           </p:sp>
         </mc:Choice>
-        <mc:Fallback>
+        <mc:Fallback xmlns="">
           <p:sp>
             <p:nvSpPr>
               <p:cNvPr id="3" name="Content Placeholder 2"/>
@@ -12788,8 +13873,8 @@
           </a:p>
         </p:txBody>
       </p:sp>
-      <mc:AlternateContent xmlns:mc="http://schemas.openxmlformats.org/markup-compatibility/2006">
-        <mc:Choice xmlns:a14="http://schemas.microsoft.com/office/drawing/2010/main" Requires="a14">
+      <mc:AlternateContent xmlns:mc="http://schemas.openxmlformats.org/markup-compatibility/2006" xmlns:a14="http://schemas.microsoft.com/office/drawing/2010/main">
+        <mc:Choice Requires="a14">
           <p:sp>
             <p:nvSpPr>
               <p:cNvPr id="3" name="Content Placeholder 2"/>
@@ -13556,7 +14641,7 @@
             </p:txBody>
           </p:sp>
         </mc:Choice>
-        <mc:Fallback>
+        <mc:Fallback xmlns="">
           <p:sp>
             <p:nvSpPr>
               <p:cNvPr id="3" name="Content Placeholder 2"/>
@@ -13639,8 +14724,8 @@
           </a:p>
         </p:txBody>
       </p:sp>
-      <mc:AlternateContent xmlns:mc="http://schemas.openxmlformats.org/markup-compatibility/2006">
-        <mc:Choice xmlns:a14="http://schemas.microsoft.com/office/drawing/2010/main" Requires="a14">
+      <mc:AlternateContent xmlns:mc="http://schemas.openxmlformats.org/markup-compatibility/2006" xmlns:a14="http://schemas.microsoft.com/office/drawing/2010/main">
+        <mc:Choice Requires="a14">
           <p:sp>
             <p:nvSpPr>
               <p:cNvPr id="3" name="Content Placeholder 2"/>
@@ -14310,7 +15395,7 @@
             </p:txBody>
           </p:sp>
         </mc:Choice>
-        <mc:Fallback>
+        <mc:Fallback xmlns="">
           <p:sp>
             <p:nvSpPr>
               <p:cNvPr id="3" name="Content Placeholder 2"/>
@@ -14393,8 +15478,8 @@
           </a:p>
         </p:txBody>
       </p:sp>
-      <mc:AlternateContent xmlns:mc="http://schemas.openxmlformats.org/markup-compatibility/2006">
-        <mc:Choice xmlns:a14="http://schemas.microsoft.com/office/drawing/2010/main" Requires="a14">
+      <mc:AlternateContent xmlns:mc="http://schemas.openxmlformats.org/markup-compatibility/2006" xmlns:a14="http://schemas.microsoft.com/office/drawing/2010/main">
+        <mc:Choice Requires="a14">
           <p:sp>
             <p:nvSpPr>
               <p:cNvPr id="3" name="Content Placeholder 2"/>
@@ -14913,7 +15998,7 @@
             </p:txBody>
           </p:sp>
         </mc:Choice>
-        <mc:Fallback>
+        <mc:Fallback xmlns="">
           <p:sp>
             <p:nvSpPr>
               <p:cNvPr id="3" name="Content Placeholder 2"/>
@@ -18064,8 +19149,8 @@
           </a:p>
         </p:txBody>
       </p:sp>
-      <mc:AlternateContent xmlns:mc="http://schemas.openxmlformats.org/markup-compatibility/2006">
-        <mc:Choice xmlns:a14="http://schemas.microsoft.com/office/drawing/2010/main" Requires="a14">
+      <mc:AlternateContent xmlns:mc="http://schemas.openxmlformats.org/markup-compatibility/2006" xmlns:a14="http://schemas.microsoft.com/office/drawing/2010/main">
+        <mc:Choice Requires="a14">
           <p:sp>
             <p:nvSpPr>
               <p:cNvPr id="3" name="Content Placeholder 2"/>
@@ -18372,7 +19457,7 @@
             </p:txBody>
           </p:sp>
         </mc:Choice>
-        <mc:Fallback>
+        <mc:Fallback xmlns="">
           <p:sp>
             <p:nvSpPr>
               <p:cNvPr id="3" name="Content Placeholder 2"/>
@@ -22898,11 +23983,11 @@
             <a:pPr lvl="1"/>
             <a:r>
               <a:rPr b="1" dirty="0"/>
-              <a:t>seasonal I</a:t>
+              <a:t>seasonal </a:t>
             </a:r>
             <a:r>
               <a:rPr dirty="0"/>
-              <a:t> component accounts for random walk and trend of seasonal components</a:t>
+              <a:t>component accounts for random walk and trend of seasonal components</a:t>
             </a:r>
           </a:p>
           <a:p>
@@ -23771,13 +24856,17 @@
                 </a:r>
                 <a:r>
                   <a:rPr lang="en-US" b="1" dirty="0"/>
-                  <a:t>constant coefficients </a:t>
+                  <a:t>constant coefficients,</a:t>
                 </a:r>
                 <a:r>
                   <a:rPr lang="en-US" dirty="0"/>
-                  <a:t>so only defined for stationary time series</a:t>
-                </a:r>
-                <a:endParaRPr dirty="0"/>
+                  <a:t> </a:t>
+                </a:r>
+                <a:r>
+                  <a:rPr lang="en-US" b="1" dirty="0"/>
+                  <a:t>only defined for stationary time series!</a:t>
+                </a:r>
+                <a:endParaRPr b="1" dirty="0"/>
               </a:p>
             </p:txBody>
           </p:sp>

</xml_diff>

<commit_message>
Corrections and updates to time series forecast slides
</commit_message>
<xml_diff>
--- a/LectureSlides/12_IntroductionToTimeSeriesForecasting.pptx
+++ b/LectureSlides/12_IntroductionToTimeSeriesForecasting.pptx
@@ -62,11 +62,6 @@
     <p:sldId id="301" r:id="rId56"/>
     <p:sldId id="351" r:id="rId57"/>
     <p:sldId id="302" r:id="rId58"/>
-    <p:sldId id="303" r:id="rId59"/>
-    <p:sldId id="304" r:id="rId60"/>
-    <p:sldId id="305" r:id="rId61"/>
-    <p:sldId id="306" r:id="rId62"/>
-    <p:sldId id="307" r:id="rId63"/>
   </p:sldIdLst>
   <p:sldSz cx="9144000" cy="5143500" type="screen16x9"/>
   <p:notesSz cx="6858000" cy="9144000"/>
@@ -32597,15 +32592,7 @@
               <a:p>
                 <a:r>
                   <a:rPr lang="en-US" dirty="0"/>
-                  <a:t>Example; a time series with hourly (period=24) and day of the week (period=</a:t>
-                </a:r>
-                <a:r>
-                  <a:rPr lang="en-US"/>
-                  <a:t>7*24=168) periods, </a:t>
-                </a:r>
-                <a:r>
-                  <a:rPr lang="en-US" dirty="0"/>
-                  <a:t>the harmonics are written </a:t>
+                  <a:t>Example; a time series with hourly (period=24) and day of the week (period=7*24=168) periods, the harmonics are written </a:t>
                 </a:r>
               </a:p>
               <a:p>
@@ -33262,6 +33249,11 @@
               <a:rPr dirty="0"/>
               <a:t> well suited for some business forecasting</a:t>
             </a:r>
+            <a:r>
+              <a:rPr lang="en-US" dirty="0"/>
+              <a:t> problems</a:t>
+            </a:r>
+            <a:endParaRPr dirty="0"/>
           </a:p>
           <a:p>
             <a:pPr lvl="0"/>
@@ -33858,551 +33850,6 @@
 </p:sld>
 </file>
 
-<file path=ppt/slides/slide58.xml><?xml version="1.0" encoding="utf-8"?>
-<p:sld xmlns:a="http://schemas.openxmlformats.org/drawingml/2006/main" xmlns:r="http://schemas.openxmlformats.org/officeDocument/2006/relationships" xmlns:p="http://schemas.openxmlformats.org/presentationml/2006/main">
-  <p:cSld>
-    <p:spTree>
-      <p:nvGrpSpPr>
-        <p:cNvPr id="1" name=""/>
-        <p:cNvGrpSpPr/>
-        <p:nvPr/>
-      </p:nvGrpSpPr>
-      <p:grpSpPr>
-        <a:xfrm>
-          <a:off x="0" y="0"/>
-          <a:ext cx="0" cy="0"/>
-          <a:chOff x="0" y="0"/>
-          <a:chExt cx="0" cy="0"/>
-        </a:xfrm>
-      </p:grpSpPr>
-      <p:sp>
-        <p:nvSpPr>
-          <p:cNvPr id="2" name="Title 1"/>
-          <p:cNvSpPr>
-            <a:spLocks noGrp="1"/>
-          </p:cNvSpPr>
-          <p:nvPr>
-            <p:ph type="title"/>
-          </p:nvPr>
-        </p:nvSpPr>
-        <p:spPr/>
-        <p:txBody>
-          <a:bodyPr/>
-          <a:lstStyle/>
-          <a:p>
-            <a:pPr marL="0" lvl="0" indent="0">
-              <a:buNone/>
-            </a:pPr>
-            <a:r>
-              <a:t>Exponential Smoothing Models</a:t>
-            </a:r>
-          </a:p>
-        </p:txBody>
-      </p:sp>
-      <mc:AlternateContent xmlns:mc="http://schemas.openxmlformats.org/markup-compatibility/2006" xmlns:a14="http://schemas.microsoft.com/office/drawing/2010/main">
-        <mc:Choice Requires="a14">
-          <p:sp>
-            <p:nvSpPr>
-              <p:cNvPr id="3" name="Content Placeholder 2"/>
-              <p:cNvSpPr>
-                <a:spLocks noGrp="1"/>
-              </p:cNvSpPr>
-              <p:nvPr>
-                <p:ph idx="1"/>
-              </p:nvPr>
-            </p:nvSpPr>
-            <p:spPr/>
-            <p:txBody>
-              <a:bodyPr>
-                <a:normAutofit fontScale="70000" lnSpcReduction="20000"/>
-              </a:bodyPr>
-              <a:lstStyle/>
-              <a:p>
-                <a:pPr marL="0" lvl="0" indent="0">
-                  <a:buNone/>
-                </a:pPr>
-                <a:r>
-                  <a:rPr>
-                    <a:hlinkClick r:id="rId2"/>
-                  </a:rPr>
-                  <a:t>Exponential smoothing models</a:t>
-                </a:r>
-                <a:r>
-                  <a:t> are simple and widely used</a:t>
-                </a:r>
-              </a:p>
-              <a:p>
-                <a:pPr lvl="0"/>
-                <a:r>
-                  <a:t>Consider the simple first order model</a:t>
-                </a:r>
-                <a:br/>
-                <a:endParaRPr/>
-              </a:p>
-              <a:p>
-                <a:pPr lvl="0"/>
-                <a:r>
-                  <a:t>Set initial conditions:</a:t>
-                </a:r>
-              </a:p>
-              <a:p>
-                <a:pPr marL="0" lvl="0" indent="0">
-                  <a:buNone/>
-                </a:pPr>
-                <a14:m>
-                  <m:oMathPara xmlns:m="http://schemas.openxmlformats.org/officeDocument/2006/math">
-                    <m:oMathParaPr>
-                      <m:jc m:val="center"/>
-                    </m:oMathParaPr>
-                    <m:oMath xmlns:m="http://schemas.openxmlformats.org/officeDocument/2006/math">
-                      <m:sSub>
-                        <m:sSubPr>
-                          <m:ctrlPr>
-                            <a:rPr i="1">
-                              <a:latin typeface="Cambria Math" panose="02040503050406030204" pitchFamily="18" charset="0"/>
-                            </a:rPr>
-                          </m:ctrlPr>
-                        </m:sSubPr>
-                        <m:e>
-                          <m:r>
-                            <a:rPr>
-                              <a:latin typeface="Cambria Math" panose="02040503050406030204" pitchFamily="18" charset="0"/>
-                            </a:rPr>
-                            <m:t>𝑠</m:t>
-                          </m:r>
-                        </m:e>
-                        <m:sub>
-                          <m:r>
-                            <a:rPr>
-                              <a:latin typeface="Cambria Math" panose="02040503050406030204" pitchFamily="18" charset="0"/>
-                            </a:rPr>
-                            <m:t>0</m:t>
-                          </m:r>
-                        </m:sub>
-                      </m:sSub>
-                      <m:r>
-                        <a:rPr>
-                          <a:latin typeface="Cambria Math" panose="02040503050406030204" pitchFamily="18" charset="0"/>
-                        </a:rPr>
-                        <m:t>=</m:t>
-                      </m:r>
-                      <m:sSub>
-                        <m:sSubPr>
-                          <m:ctrlPr>
-                            <a:rPr i="1">
-                              <a:latin typeface="Cambria Math" panose="02040503050406030204" pitchFamily="18" charset="0"/>
-                            </a:rPr>
-                          </m:ctrlPr>
-                        </m:sSubPr>
-                        <m:e>
-                          <m:r>
-                            <a:rPr>
-                              <a:latin typeface="Cambria Math" panose="02040503050406030204" pitchFamily="18" charset="0"/>
-                            </a:rPr>
-                            <m:t>𝑦</m:t>
-                          </m:r>
-                        </m:e>
-                        <m:sub>
-                          <m:r>
-                            <a:rPr>
-                              <a:latin typeface="Cambria Math" panose="02040503050406030204" pitchFamily="18" charset="0"/>
-                            </a:rPr>
-                            <m:t>0</m:t>
-                          </m:r>
-                        </m:sub>
-                      </m:sSub>
-                    </m:oMath>
-                  </m:oMathPara>
-                </a14:m>
-                <a:endParaRPr/>
-              </a:p>
-              <a:p>
-                <a:pPr lvl="0"/>
-                <a:r>
-                  <a:t>The smoothed update is:</a:t>
-                </a:r>
-              </a:p>
-              <a:p>
-                <a:pPr marL="0" lvl="0" indent="0">
-                  <a:buNone/>
-                </a:pPr>
-                <a:r>
-                  <a:t>$$ s_t = \alpha y_t + (1-\alpha) s_{t-1}\\ 
-= s_{t-1} \alpha(y_t - s_{t-1}),\\ 
-t \gt 0 $$</a:t>
-                </a:r>
-              </a:p>
-              <a:p>
-                <a:pPr lvl="0"/>
-                <a:r>
-                  <a:t>And, the smoothing coefficient is, </a:t>
-                </a:r>
-                <a14:m>
-                  <m:oMath xmlns:m="http://schemas.openxmlformats.org/officeDocument/2006/math">
-                    <m:r>
-                      <a:rPr>
-                        <a:latin typeface="Cambria Math" panose="02040503050406030204" pitchFamily="18" charset="0"/>
-                      </a:rPr>
-                      <m:t>0</m:t>
-                    </m:r>
-                    <m:r>
-                      <a:rPr>
-                        <a:latin typeface="Cambria Math" panose="02040503050406030204" pitchFamily="18" charset="0"/>
-                      </a:rPr>
-                      <m:t>≤</m:t>
-                    </m:r>
-                    <m:r>
-                      <a:rPr>
-                        <a:latin typeface="Cambria Math" panose="02040503050406030204" pitchFamily="18" charset="0"/>
-                      </a:rPr>
-                      <m:t>𝛼</m:t>
-                    </m:r>
-                    <m:r>
-                      <a:rPr>
-                        <a:latin typeface="Cambria Math" panose="02040503050406030204" pitchFamily="18" charset="0"/>
-                      </a:rPr>
-                      <m:t>≤</m:t>
-                    </m:r>
-                    <m:r>
-                      <a:rPr>
-                        <a:latin typeface="Cambria Math" panose="02040503050406030204" pitchFamily="18" charset="0"/>
-                      </a:rPr>
-                      <m:t>1</m:t>
-                    </m:r>
-                  </m:oMath>
-                </a14:m>
-                <a:br/>
-                <a:endParaRPr/>
-              </a:p>
-              <a:p>
-                <a:pPr lvl="0"/>
-                <a:r>
-                  <a:t>But, model only works if no trend</a:t>
-                </a:r>
-              </a:p>
-            </p:txBody>
-          </p:sp>
-        </mc:Choice>
-        <mc:Fallback xmlns="">
-          <p:sp>
-            <p:nvSpPr>
-              <p:cNvPr id="3" name="Content Placeholder 2"/>
-              <p:cNvSpPr>
-                <a:spLocks noGrp="1" noRot="1" noChangeAspect="1" noMove="1" noResize="1" noEditPoints="1" noAdjustHandles="1" noChangeArrowheads="1" noChangeShapeType="1" noTextEdit="1"/>
-              </p:cNvSpPr>
-              <p:nvPr>
-                <p:ph idx="1"/>
-              </p:nvPr>
-            </p:nvSpPr>
-            <p:spPr>
-              <a:blipFill>
-                <a:blip r:embed="rId3"/>
-                <a:stretch>
-                  <a:fillRect l="-444" t="-1975"/>
-                </a:stretch>
-              </a:blipFill>
-            </p:spPr>
-            <p:txBody>
-              <a:bodyPr/>
-              <a:lstStyle/>
-              <a:p>
-                <a:r>
-                  <a:rPr lang="en-US">
-                    <a:noFill/>
-                  </a:rPr>
-                  <a:t> </a:t>
-                </a:r>
-              </a:p>
-            </p:txBody>
-          </p:sp>
-        </mc:Fallback>
-      </mc:AlternateContent>
-    </p:spTree>
-  </p:cSld>
-  <p:clrMapOvr>
-    <a:masterClrMapping/>
-  </p:clrMapOvr>
-</p:sld>
-</file>
-
-<file path=ppt/slides/slide59.xml><?xml version="1.0" encoding="utf-8"?>
-<p:sld xmlns:a="http://schemas.openxmlformats.org/drawingml/2006/main" xmlns:r="http://schemas.openxmlformats.org/officeDocument/2006/relationships" xmlns:p="http://schemas.openxmlformats.org/presentationml/2006/main">
-  <p:cSld>
-    <p:spTree>
-      <p:nvGrpSpPr>
-        <p:cNvPr id="1" name=""/>
-        <p:cNvGrpSpPr/>
-        <p:nvPr/>
-      </p:nvGrpSpPr>
-      <p:grpSpPr>
-        <a:xfrm>
-          <a:off x="0" y="0"/>
-          <a:ext cx="0" cy="0"/>
-          <a:chOff x="0" y="0"/>
-          <a:chExt cx="0" cy="0"/>
-        </a:xfrm>
-      </p:grpSpPr>
-      <p:sp>
-        <p:nvSpPr>
-          <p:cNvPr id="2" name="Title 1"/>
-          <p:cNvSpPr>
-            <a:spLocks noGrp="1"/>
-          </p:cNvSpPr>
-          <p:nvPr>
-            <p:ph type="title"/>
-          </p:nvPr>
-        </p:nvSpPr>
-        <p:spPr/>
-        <p:txBody>
-          <a:bodyPr/>
-          <a:lstStyle/>
-          <a:p>
-            <a:pPr marL="0" lvl="0" indent="0">
-              <a:buNone/>
-            </a:pPr>
-            <a:r>
-              <a:t>Exponential Smoothing Models</a:t>
-            </a:r>
-          </a:p>
-        </p:txBody>
-      </p:sp>
-      <mc:AlternateContent xmlns:mc="http://schemas.openxmlformats.org/markup-compatibility/2006" xmlns:a14="http://schemas.microsoft.com/office/drawing/2010/main">
-        <mc:Choice Requires="a14">
-          <p:sp>
-            <p:nvSpPr>
-              <p:cNvPr id="3" name="Content Placeholder 2"/>
-              <p:cNvSpPr>
-                <a:spLocks noGrp="1"/>
-              </p:cNvSpPr>
-              <p:nvPr>
-                <p:ph idx="1"/>
-              </p:nvPr>
-            </p:nvSpPr>
-            <p:spPr/>
-            <p:txBody>
-              <a:bodyPr/>
-              <a:lstStyle/>
-              <a:p>
-                <a:pPr marL="0" lvl="0" indent="0">
-                  <a:buNone/>
-                </a:pPr>
-                <a:r>
-                  <a:t>Decay and exponential smoothing</a:t>
-                </a:r>
-              </a:p>
-              <a:p>
-                <a:pPr lvl="0"/>
-                <a:r>
-                  <a:t>We can understand the smoothing parameter </a:t>
-                </a:r>
-                <a14:m>
-                  <m:oMath xmlns:m="http://schemas.openxmlformats.org/officeDocument/2006/math">
-                    <m:r>
-                      <a:rPr>
-                        <a:latin typeface="Cambria Math" panose="02040503050406030204" pitchFamily="18" charset="0"/>
-                      </a:rPr>
-                      <m:t>𝛼</m:t>
-                    </m:r>
-                  </m:oMath>
-                </a14:m>
-                <a:r>
-                  <a:t> in terms of a </a:t>
-                </a:r>
-                <a:r>
-                  <a:rPr b="1"/>
-                  <a:t>decay constant</a:t>
-                </a:r>
-                <a:r>
-                  <a:t>, </a:t>
-                </a:r>
-                <a14:m>
-                  <m:oMath xmlns:m="http://schemas.openxmlformats.org/officeDocument/2006/math">
-                    <m:r>
-                      <a:rPr>
-                        <a:latin typeface="Cambria Math" panose="02040503050406030204" pitchFamily="18" charset="0"/>
-                      </a:rPr>
-                      <m:t>𝜏</m:t>
-                    </m:r>
-                  </m:oMath>
-                </a14:m>
-                <a:endParaRPr/>
-              </a:p>
-              <a:p>
-                <a:pPr marL="0" lvl="0" indent="0">
-                  <a:buNone/>
-                </a:pPr>
-                <a14:m>
-                  <m:oMathPara xmlns:m="http://schemas.openxmlformats.org/officeDocument/2006/math">
-                    <m:oMathParaPr>
-                      <m:jc m:val="center"/>
-                    </m:oMathParaPr>
-                    <m:oMath xmlns:m="http://schemas.openxmlformats.org/officeDocument/2006/math">
-                      <m:r>
-                        <a:rPr>
-                          <a:latin typeface="Cambria Math" panose="02040503050406030204" pitchFamily="18" charset="0"/>
-                        </a:rPr>
-                        <m:t>𝛼</m:t>
-                      </m:r>
-                      <m:r>
-                        <a:rPr>
-                          <a:latin typeface="Cambria Math" panose="02040503050406030204" pitchFamily="18" charset="0"/>
-                        </a:rPr>
-                        <m:t>=</m:t>
-                      </m:r>
-                      <m:r>
-                        <a:rPr>
-                          <a:latin typeface="Cambria Math" panose="02040503050406030204" pitchFamily="18" charset="0"/>
-                        </a:rPr>
-                        <m:t>1</m:t>
-                      </m:r>
-                      <m:r>
-                        <a:rPr>
-                          <a:latin typeface="Cambria Math" panose="02040503050406030204" pitchFamily="18" charset="0"/>
-                        </a:rPr>
-                        <m:t>−</m:t>
-                      </m:r>
-                      <m:sSup>
-                        <m:sSupPr>
-                          <m:ctrlPr>
-                            <a:rPr i="1">
-                              <a:latin typeface="Cambria Math" panose="02040503050406030204" pitchFamily="18" charset="0"/>
-                            </a:rPr>
-                          </m:ctrlPr>
-                        </m:sSupPr>
-                        <m:e>
-                          <m:r>
-                            <a:rPr>
-                              <a:latin typeface="Cambria Math" panose="02040503050406030204" pitchFamily="18" charset="0"/>
-                            </a:rPr>
-                            <m:t>𝑒</m:t>
-                          </m:r>
-                        </m:e>
-                        <m:sup>
-                          <m:d>
-                            <m:dPr>
-                              <m:ctrlPr>
-                                <a:rPr i="1">
-                                  <a:latin typeface="Cambria Math" panose="02040503050406030204" pitchFamily="18" charset="0"/>
-                                </a:rPr>
-                              </m:ctrlPr>
-                            </m:dPr>
-                            <m:e>
-                              <m:f>
-                                <m:fPr>
-                                  <m:ctrlPr>
-                                    <a:rPr i="1">
-                                      <a:latin typeface="Cambria Math" panose="02040503050406030204" pitchFamily="18" charset="0"/>
-                                    </a:rPr>
-                                  </m:ctrlPr>
-                                </m:fPr>
-                                <m:num>
-                                  <m:r>
-                                    <a:rPr>
-                                      <a:latin typeface="Cambria Math" panose="02040503050406030204" pitchFamily="18" charset="0"/>
-                                    </a:rPr>
-                                    <m:t>𝛥</m:t>
-                                  </m:r>
-                                  <m:r>
-                                    <a:rPr>
-                                      <a:latin typeface="Cambria Math" panose="02040503050406030204" pitchFamily="18" charset="0"/>
-                                    </a:rPr>
-                                    <m:t>𝑇</m:t>
-                                  </m:r>
-                                </m:num>
-                                <m:den>
-                                  <m:r>
-                                    <a:rPr>
-                                      <a:latin typeface="Cambria Math" panose="02040503050406030204" pitchFamily="18" charset="0"/>
-                                    </a:rPr>
-                                    <m:t>𝜏</m:t>
-                                  </m:r>
-                                </m:den>
-                              </m:f>
-                            </m:e>
-                          </m:d>
-                        </m:sup>
-                      </m:sSup>
-                    </m:oMath>
-                  </m:oMathPara>
-                </a14:m>
-                <a:endParaRPr/>
-              </a:p>
-              <a:p>
-                <a:pPr lvl="0"/>
-                <a:r>
-                  <a:t>An innovation or shock has an effect for all future time</a:t>
-                </a:r>
-                <a:br/>
-                <a:endParaRPr/>
-              </a:p>
-              <a:p>
-                <a:pPr lvl="0"/>
-                <a:r>
-                  <a:t>Effect decays exponentially with time, </a:t>
-                </a:r>
-                <a14:m>
-                  <m:oMath xmlns:m="http://schemas.openxmlformats.org/officeDocument/2006/math">
-                    <m:r>
-                      <a:rPr>
-                        <a:latin typeface="Cambria Math" panose="02040503050406030204" pitchFamily="18" charset="0"/>
-                      </a:rPr>
-                      <m:t>𝛥</m:t>
-                    </m:r>
-                    <m:r>
-                      <a:rPr>
-                        <a:latin typeface="Cambria Math" panose="02040503050406030204" pitchFamily="18" charset="0"/>
-                      </a:rPr>
-                      <m:t>𝑇</m:t>
-                    </m:r>
-                  </m:oMath>
-                </a14:m>
-                <a:endParaRPr/>
-              </a:p>
-            </p:txBody>
-          </p:sp>
-        </mc:Choice>
-        <mc:Fallback xmlns="">
-          <p:sp>
-            <p:nvSpPr>
-              <p:cNvPr id="3" name="Content Placeholder 2"/>
-              <p:cNvSpPr>
-                <a:spLocks noGrp="1" noRot="1" noChangeAspect="1" noMove="1" noResize="1" noEditPoints="1" noAdjustHandles="1" noChangeArrowheads="1" noChangeShapeType="1" noTextEdit="1"/>
-              </p:cNvSpPr>
-              <p:nvPr>
-                <p:ph idx="1"/>
-              </p:nvPr>
-            </p:nvSpPr>
-            <p:spPr>
-              <a:blipFill>
-                <a:blip r:embed="rId2"/>
-                <a:stretch>
-                  <a:fillRect l="-1111" t="-1436"/>
-                </a:stretch>
-              </a:blipFill>
-            </p:spPr>
-            <p:txBody>
-              <a:bodyPr/>
-              <a:lstStyle/>
-              <a:p>
-                <a:r>
-                  <a:rPr lang="en-US">
-                    <a:noFill/>
-                  </a:rPr>
-                  <a:t> </a:t>
-                </a:r>
-              </a:p>
-            </p:txBody>
-          </p:sp>
-        </mc:Fallback>
-      </mc:AlternateContent>
-    </p:spTree>
-  </p:cSld>
-  <p:clrMapOvr>
-    <a:masterClrMapping/>
-  </p:clrMapOvr>
-</p:sld>
-</file>
-
 <file path=ppt/slides/slide6.xml><?xml version="1.0" encoding="utf-8"?>
 <p:sld xmlns:a="http://schemas.openxmlformats.org/drawingml/2006/main" xmlns:r="http://schemas.openxmlformats.org/officeDocument/2006/relationships" xmlns:p="http://schemas.openxmlformats.org/presentationml/2006/main">
   <p:cSld>
@@ -34581,703 +34028,6 @@
           </a:p>
         </p:txBody>
       </p:sp>
-    </p:spTree>
-  </p:cSld>
-  <p:clrMapOvr>
-    <a:masterClrMapping/>
-  </p:clrMapOvr>
-</p:sld>
-</file>
-
-<file path=ppt/slides/slide60.xml><?xml version="1.0" encoding="utf-8"?>
-<p:sld xmlns:a="http://schemas.openxmlformats.org/drawingml/2006/main" xmlns:r="http://schemas.openxmlformats.org/officeDocument/2006/relationships" xmlns:p="http://schemas.openxmlformats.org/presentationml/2006/main">
-  <p:cSld>
-    <p:spTree>
-      <p:nvGrpSpPr>
-        <p:cNvPr id="1" name=""/>
-        <p:cNvGrpSpPr/>
-        <p:nvPr/>
-      </p:nvGrpSpPr>
-      <p:grpSpPr>
-        <a:xfrm>
-          <a:off x="0" y="0"/>
-          <a:ext cx="0" cy="0"/>
-          <a:chOff x="0" y="0"/>
-          <a:chExt cx="0" cy="0"/>
-        </a:xfrm>
-      </p:grpSpPr>
-      <p:sp>
-        <p:nvSpPr>
-          <p:cNvPr id="2" name="Title 1"/>
-          <p:cNvSpPr>
-            <a:spLocks noGrp="1"/>
-          </p:cNvSpPr>
-          <p:nvPr>
-            <p:ph type="title"/>
-          </p:nvPr>
-        </p:nvSpPr>
-        <p:spPr/>
-        <p:txBody>
-          <a:bodyPr/>
-          <a:lstStyle/>
-          <a:p>
-            <a:pPr marL="0" lvl="0" indent="0">
-              <a:buNone/>
-            </a:pPr>
-            <a:r>
-              <a:t>Exponential Smoothing Models</a:t>
-            </a:r>
-          </a:p>
-        </p:txBody>
-      </p:sp>
-      <mc:AlternateContent xmlns:mc="http://schemas.openxmlformats.org/markup-compatibility/2006" xmlns:a14="http://schemas.microsoft.com/office/drawing/2010/main">
-        <mc:Choice Requires="a14">
-          <p:sp>
-            <p:nvSpPr>
-              <p:cNvPr id="3" name="Content Placeholder 2"/>
-              <p:cNvSpPr>
-                <a:spLocks noGrp="1"/>
-              </p:cNvSpPr>
-              <p:nvPr>
-                <p:ph idx="1"/>
-              </p:nvPr>
-            </p:nvSpPr>
-            <p:spPr/>
-            <p:txBody>
-              <a:bodyPr>
-                <a:normAutofit fontScale="62500" lnSpcReduction="20000"/>
-              </a:bodyPr>
-              <a:lstStyle/>
-              <a:p>
-                <a:pPr marL="0" lvl="0" indent="0">
-                  <a:buNone/>
-                </a:pPr>
-                <a:r>
-                  <a:t>Can extend exponential smoothing model to accommodate trend</a:t>
-                </a:r>
-              </a:p>
-              <a:p>
-                <a:pPr lvl="0"/>
-                <a:r>
-                  <a:t>Algorithm known as </a:t>
-                </a:r>
-                <a:r>
-                  <a:rPr b="1"/>
-                  <a:t>double exponential smoothing</a:t>
-                </a:r>
-                <a:r>
-                  <a:t> or </a:t>
-                </a:r>
-                <a:r>
-                  <a:rPr b="1"/>
-                  <a:t>Holt-Winters double exponential smoothing</a:t>
-                </a:r>
-                <a:br/>
-                <a:endParaRPr/>
-              </a:p>
-              <a:p>
-                <a:pPr lvl="0"/>
-                <a:r>
-                  <a:t>Update smoothed values and slope at each time step</a:t>
-                </a:r>
-                <a:br/>
-                <a:endParaRPr/>
-              </a:p>
-              <a:p>
-                <a:pPr lvl="0"/>
-                <a:r>
-                  <a:t>Start with initial values</a:t>
-                </a:r>
-              </a:p>
-              <a:p>
-                <a:pPr marL="0" lvl="0" indent="0">
-                  <a:buNone/>
-                </a:pPr>
-                <a:r>
-                  <a:t>$$s_1 = y_1\\
-b_1 = y_2 - y_1$$</a:t>
-                </a:r>
-              </a:p>
-              <a:p>
-                <a:pPr lvl="0"/>
-                <a:r>
-                  <a:t>Update relationships for both smoothed value and slope</a:t>
-                </a:r>
-              </a:p>
-              <a:p>
-                <a:pPr marL="0" lvl="0" indent="0">
-                  <a:buNone/>
-                </a:pPr>
-                <a:r>
-                  <a:t>$$s_t = \alpha y_t + (1-\alpha) (s_{t-1} + b_{t-1})\\
-b_t = \beta(s_t - s_{t-1}) + (1 - \beta)b_{t-1}$$</a:t>
-                </a:r>
-              </a:p>
-              <a:p>
-                <a:pPr lvl="0"/>
-                <a:r>
-                  <a:t>Additional slope smoothing hyperparameter, </a:t>
-                </a:r>
-                <a14:m>
-                  <m:oMath xmlns:m="http://schemas.openxmlformats.org/officeDocument/2006/math">
-                    <m:r>
-                      <a:rPr>
-                        <a:latin typeface="Cambria Math" panose="02040503050406030204" pitchFamily="18" charset="0"/>
-                      </a:rPr>
-                      <m:t>0</m:t>
-                    </m:r>
-                    <m:r>
-                      <a:rPr>
-                        <a:latin typeface="Cambria Math" panose="02040503050406030204" pitchFamily="18" charset="0"/>
-                      </a:rPr>
-                      <m:t>≤</m:t>
-                    </m:r>
-                    <m:r>
-                      <a:rPr>
-                        <a:latin typeface="Cambria Math" panose="02040503050406030204" pitchFamily="18" charset="0"/>
-                      </a:rPr>
-                      <m:t>𝛽</m:t>
-                    </m:r>
-                    <m:r>
-                      <a:rPr>
-                        <a:latin typeface="Cambria Math" panose="02040503050406030204" pitchFamily="18" charset="0"/>
-                      </a:rPr>
-                      <m:t>≤</m:t>
-                    </m:r>
-                    <m:r>
-                      <a:rPr>
-                        <a:latin typeface="Cambria Math" panose="02040503050406030204" pitchFamily="18" charset="0"/>
-                      </a:rPr>
-                      <m:t>1</m:t>
-                    </m:r>
-                  </m:oMath>
-                </a14:m>
-                <a:br/>
-                <a:endParaRPr/>
-              </a:p>
-              <a:p>
-                <a:pPr lvl="0"/>
-                <a:r>
-                  <a:t>Use </a:t>
-                </a:r>
-                <a:r>
-                  <a:rPr b="1"/>
-                  <a:t>third order</a:t>
-                </a:r>
-                <a:r>
-                  <a:t> update includes seasonality in </a:t>
-                </a:r>
-                <a:r>
-                  <a:rPr b="1"/>
-                  <a:t>Holt-Winters smoother</a:t>
-                </a:r>
-              </a:p>
-            </p:txBody>
-          </p:sp>
-        </mc:Choice>
-        <mc:Fallback xmlns="">
-          <p:sp>
-            <p:nvSpPr>
-              <p:cNvPr id="3" name="Content Placeholder 2"/>
-              <p:cNvSpPr>
-                <a:spLocks noGrp="1" noRot="1" noChangeAspect="1" noMove="1" noResize="1" noEditPoints="1" noAdjustHandles="1" noChangeArrowheads="1" noChangeShapeType="1" noTextEdit="1"/>
-              </p:cNvSpPr>
-              <p:nvPr>
-                <p:ph idx="1"/>
-              </p:nvPr>
-            </p:nvSpPr>
-            <p:spPr>
-              <a:blipFill>
-                <a:blip r:embed="rId2"/>
-                <a:stretch>
-                  <a:fillRect l="-296" t="-1436"/>
-                </a:stretch>
-              </a:blipFill>
-            </p:spPr>
-            <p:txBody>
-              <a:bodyPr/>
-              <a:lstStyle/>
-              <a:p>
-                <a:r>
-                  <a:rPr lang="en-US">
-                    <a:noFill/>
-                  </a:rPr>
-                  <a:t> </a:t>
-                </a:r>
-              </a:p>
-            </p:txBody>
-          </p:sp>
-        </mc:Fallback>
-      </mc:AlternateContent>
-    </p:spTree>
-  </p:cSld>
-  <p:clrMapOvr>
-    <a:masterClrMapping/>
-  </p:clrMapOvr>
-</p:sld>
-</file>
-
-<file path=ppt/slides/slide61.xml><?xml version="1.0" encoding="utf-8"?>
-<p:sld xmlns:a="http://schemas.openxmlformats.org/drawingml/2006/main" xmlns:r="http://schemas.openxmlformats.org/officeDocument/2006/relationships" xmlns:p="http://schemas.openxmlformats.org/presentationml/2006/main">
-  <p:cSld>
-    <p:spTree>
-      <p:nvGrpSpPr>
-        <p:cNvPr id="1" name=""/>
-        <p:cNvGrpSpPr/>
-        <p:nvPr/>
-      </p:nvGrpSpPr>
-      <p:grpSpPr>
-        <a:xfrm>
-          <a:off x="0" y="0"/>
-          <a:ext cx="0" cy="0"/>
-          <a:chOff x="0" y="0"/>
-          <a:chExt cx="0" cy="0"/>
-        </a:xfrm>
-      </p:grpSpPr>
-      <p:sp>
-        <p:nvSpPr>
-          <p:cNvPr id="2" name="Title 1"/>
-          <p:cNvSpPr>
-            <a:spLocks noGrp="1"/>
-          </p:cNvSpPr>
-          <p:nvPr>
-            <p:ph type="title"/>
-          </p:nvPr>
-        </p:nvSpPr>
-        <p:spPr/>
-        <p:txBody>
-          <a:bodyPr/>
-          <a:lstStyle/>
-          <a:p>
-            <a:pPr marL="0" lvl="0" indent="0">
-              <a:buNone/>
-            </a:pPr>
-            <a:r>
-              <a:t>Exponential Smoothing Models</a:t>
-            </a:r>
-          </a:p>
-        </p:txBody>
-      </p:sp>
-      <mc:AlternateContent xmlns:mc="http://schemas.openxmlformats.org/markup-compatibility/2006" xmlns:a14="http://schemas.microsoft.com/office/drawing/2010/main">
-        <mc:Choice Requires="a14">
-          <p:sp>
-            <p:nvSpPr>
-              <p:cNvPr id="3" name="Content Placeholder 2"/>
-              <p:cNvSpPr>
-                <a:spLocks noGrp="1"/>
-              </p:cNvSpPr>
-              <p:nvPr>
-                <p:ph idx="1"/>
-              </p:nvPr>
-            </p:nvSpPr>
-            <p:spPr/>
-            <p:txBody>
-              <a:bodyPr>
-                <a:normAutofit fontScale="92500" lnSpcReduction="10000"/>
-              </a:bodyPr>
-              <a:lstStyle/>
-              <a:p>
-                <a:pPr marL="0" lvl="0" indent="0">
-                  <a:buNone/>
-                </a:pPr>
-                <a:r>
-                  <a:t>Exponential smoothing models are useful for forecasting</a:t>
-                </a:r>
-              </a:p>
-              <a:p>
-                <a:pPr lvl="0"/>
-                <a:r>
-                  <a:t>Forecast dependent on the choice of smoothing parameters</a:t>
-                </a:r>
-                <a:br/>
-                <a:endParaRPr/>
-              </a:p>
-              <a:p>
-                <a:pPr lvl="0"/>
-                <a:r>
-                  <a:t>Can forecast with first, second, third order models</a:t>
-                </a:r>
-                <a:br/>
-                <a:endParaRPr/>
-              </a:p>
-              <a:p>
-                <a:pPr lvl="0"/>
-                <a:r>
-                  <a:t>For second order model (with trend) the forecast </a:t>
-                </a:r>
-                <a14:m>
-                  <m:oMath xmlns:m="http://schemas.openxmlformats.org/officeDocument/2006/math">
-                    <m:r>
-                      <a:rPr>
-                        <a:latin typeface="Cambria Math" panose="02040503050406030204" pitchFamily="18" charset="0"/>
-                      </a:rPr>
-                      <m:t>𝑚</m:t>
-                    </m:r>
-                  </m:oMath>
-                </a14:m>
-                <a:r>
-                  <a:t> steps ahead is:</a:t>
-                </a:r>
-              </a:p>
-              <a:p>
-                <a:pPr marL="0" lvl="0" indent="0">
-                  <a:buNone/>
-                </a:pPr>
-                <a14:m>
-                  <m:oMathPara xmlns:m="http://schemas.openxmlformats.org/officeDocument/2006/math">
-                    <m:oMathParaPr>
-                      <m:jc m:val="center"/>
-                    </m:oMathParaPr>
-                    <m:oMath xmlns:m="http://schemas.openxmlformats.org/officeDocument/2006/math">
-                      <m:sSub>
-                        <m:sSubPr>
-                          <m:ctrlPr>
-                            <a:rPr i="1">
-                              <a:latin typeface="Cambria Math" panose="02040503050406030204" pitchFamily="18" charset="0"/>
-                            </a:rPr>
-                          </m:ctrlPr>
-                        </m:sSubPr>
-                        <m:e>
-                          <m:r>
-                            <a:rPr>
-                              <a:latin typeface="Cambria Math" panose="02040503050406030204" pitchFamily="18" charset="0"/>
-                            </a:rPr>
-                            <m:t>𝐹</m:t>
-                          </m:r>
-                        </m:e>
-                        <m:sub>
-                          <m:r>
-                            <a:rPr>
-                              <a:latin typeface="Cambria Math" panose="02040503050406030204" pitchFamily="18" charset="0"/>
-                            </a:rPr>
-                            <m:t>𝑡</m:t>
-                          </m:r>
-                          <m:r>
-                            <a:rPr>
-                              <a:latin typeface="Cambria Math" panose="02040503050406030204" pitchFamily="18" charset="0"/>
-                            </a:rPr>
-                            <m:t>+</m:t>
-                          </m:r>
-                          <m:r>
-                            <a:rPr>
-                              <a:latin typeface="Cambria Math" panose="02040503050406030204" pitchFamily="18" charset="0"/>
-                            </a:rPr>
-                            <m:t>𝑚</m:t>
-                          </m:r>
-                        </m:sub>
-                      </m:sSub>
-                      <m:r>
-                        <a:rPr>
-                          <a:latin typeface="Cambria Math" panose="02040503050406030204" pitchFamily="18" charset="0"/>
-                        </a:rPr>
-                        <m:t>=</m:t>
-                      </m:r>
-                      <m:sSub>
-                        <m:sSubPr>
-                          <m:ctrlPr>
-                            <a:rPr i="1">
-                              <a:latin typeface="Cambria Math" panose="02040503050406030204" pitchFamily="18" charset="0"/>
-                            </a:rPr>
-                          </m:ctrlPr>
-                        </m:sSubPr>
-                        <m:e>
-                          <m:r>
-                            <a:rPr>
-                              <a:latin typeface="Cambria Math" panose="02040503050406030204" pitchFamily="18" charset="0"/>
-                            </a:rPr>
-                            <m:t>𝑠</m:t>
-                          </m:r>
-                        </m:e>
-                        <m:sub>
-                          <m:r>
-                            <a:rPr>
-                              <a:latin typeface="Cambria Math" panose="02040503050406030204" pitchFamily="18" charset="0"/>
-                            </a:rPr>
-                            <m:t>𝑡</m:t>
-                          </m:r>
-                        </m:sub>
-                      </m:sSub>
-                      <m:r>
-                        <a:rPr>
-                          <a:latin typeface="Cambria Math" panose="02040503050406030204" pitchFamily="18" charset="0"/>
-                        </a:rPr>
-                        <m:t>+</m:t>
-                      </m:r>
-                      <m:r>
-                        <a:rPr>
-                          <a:latin typeface="Cambria Math" panose="02040503050406030204" pitchFamily="18" charset="0"/>
-                        </a:rPr>
-                        <m:t>𝑚</m:t>
-                      </m:r>
-                      <m:sSub>
-                        <m:sSubPr>
-                          <m:ctrlPr>
-                            <a:rPr i="1">
-                              <a:latin typeface="Cambria Math" panose="02040503050406030204" pitchFamily="18" charset="0"/>
-                            </a:rPr>
-                          </m:ctrlPr>
-                        </m:sSubPr>
-                        <m:e>
-                          <m:r>
-                            <a:rPr>
-                              <a:latin typeface="Cambria Math" panose="02040503050406030204" pitchFamily="18" charset="0"/>
-                            </a:rPr>
-                            <m:t>𝑏</m:t>
-                          </m:r>
-                        </m:e>
-                        <m:sub>
-                          <m:r>
-                            <a:rPr>
-                              <a:latin typeface="Cambria Math" panose="02040503050406030204" pitchFamily="18" charset="0"/>
-                            </a:rPr>
-                            <m:t>𝑡</m:t>
-                          </m:r>
-                        </m:sub>
-                      </m:sSub>
-                    </m:oMath>
-                  </m:oMathPara>
-                </a14:m>
-                <a:endParaRPr/>
-              </a:p>
-              <a:p>
-                <a:pPr lvl="0"/>
-                <a:r>
-                  <a:t>Third order update include seasonal terms</a:t>
-                </a:r>
-              </a:p>
-              <a:p>
-                <a:pPr lvl="0"/>
-                <a:r>
-                  <a:t>Holt-Winters smoother is a </a:t>
-                </a:r>
-                <a:r>
-                  <a:rPr b="1"/>
-                  <a:t>linear model!</a:t>
-                </a:r>
-              </a:p>
-            </p:txBody>
-          </p:sp>
-        </mc:Choice>
-        <mc:Fallback xmlns="">
-          <p:sp>
-            <p:nvSpPr>
-              <p:cNvPr id="3" name="Content Placeholder 2"/>
-              <p:cNvSpPr>
-                <a:spLocks noGrp="1" noRot="1" noChangeAspect="1" noMove="1" noResize="1" noEditPoints="1" noAdjustHandles="1" noChangeArrowheads="1" noChangeShapeType="1" noTextEdit="1"/>
-              </p:cNvSpPr>
-              <p:nvPr>
-                <p:ph idx="1"/>
-              </p:nvPr>
-            </p:nvSpPr>
-            <p:spPr>
-              <a:blipFill>
-                <a:blip r:embed="rId2"/>
-                <a:stretch>
-                  <a:fillRect l="-963" t="-2334"/>
-                </a:stretch>
-              </a:blipFill>
-            </p:spPr>
-            <p:txBody>
-              <a:bodyPr/>
-              <a:lstStyle/>
-              <a:p>
-                <a:r>
-                  <a:rPr lang="en-US">
-                    <a:noFill/>
-                  </a:rPr>
-                  <a:t> </a:t>
-                </a:r>
-              </a:p>
-            </p:txBody>
-          </p:sp>
-        </mc:Fallback>
-      </mc:AlternateContent>
-    </p:spTree>
-  </p:cSld>
-  <p:clrMapOvr>
-    <a:masterClrMapping/>
-  </p:clrMapOvr>
-</p:sld>
-</file>
-
-<file path=ppt/slides/slide62.xml><?xml version="1.0" encoding="utf-8"?>
-<p:sld xmlns:a="http://schemas.openxmlformats.org/drawingml/2006/main" xmlns:r="http://schemas.openxmlformats.org/officeDocument/2006/relationships" xmlns:p="http://schemas.openxmlformats.org/presentationml/2006/main">
-  <p:cSld>
-    <p:spTree>
-      <p:nvGrpSpPr>
-        <p:cNvPr id="1" name=""/>
-        <p:cNvGrpSpPr/>
-        <p:nvPr/>
-      </p:nvGrpSpPr>
-      <p:grpSpPr>
-        <a:xfrm>
-          <a:off x="0" y="0"/>
-          <a:ext cx="0" cy="0"/>
-          <a:chOff x="0" y="0"/>
-          <a:chExt cx="0" cy="0"/>
-        </a:xfrm>
-      </p:grpSpPr>
-      <p:sp>
-        <p:nvSpPr>
-          <p:cNvPr id="2" name="Title 1"/>
-          <p:cNvSpPr>
-            <a:spLocks noGrp="1"/>
-          </p:cNvSpPr>
-          <p:nvPr>
-            <p:ph type="title"/>
-          </p:nvPr>
-        </p:nvSpPr>
-        <p:spPr>
-          <a:xfrm>
-            <a:off x="457201" y="204787"/>
-            <a:ext cx="3008313" cy="871538"/>
-          </a:xfrm>
-        </p:spPr>
-        <p:txBody>
-          <a:bodyPr/>
-          <a:lstStyle/>
-          <a:p>
-            <a:pPr marL="0" lvl="0" indent="0">
-              <a:buNone/>
-            </a:pPr>
-            <a:r>
-              <a:t>Exponential Smoothing Models</a:t>
-            </a:r>
-          </a:p>
-        </p:txBody>
-      </p:sp>
-      <mc:AlternateContent xmlns:mc="http://schemas.openxmlformats.org/markup-compatibility/2006" xmlns:a14="http://schemas.microsoft.com/office/drawing/2010/main">
-        <mc:Choice Requires="a14">
-          <p:sp>
-            <p:nvSpPr>
-              <p:cNvPr id="4" name="Text Placeholder 3"/>
-              <p:cNvSpPr>
-                <a:spLocks noGrp="1"/>
-              </p:cNvSpPr>
-              <p:nvPr>
-                <p:ph type="body" sz="half" idx="2"/>
-              </p:nvPr>
-            </p:nvSpPr>
-            <p:spPr/>
-            <p:txBody>
-              <a:bodyPr/>
-              <a:lstStyle/>
-              <a:p>
-                <a:pPr marL="0" lvl="0" indent="0">
-                  <a:buNone/>
-                </a:pPr>
-                <a:r>
-                  <a:t>Example of smoothing trend plus white noise series</a:t>
-                </a:r>
-              </a:p>
-              <a:p>
-                <a:pPr lvl="0"/>
-                <a:r>
-                  <a:t>Decreasing the smoothing parameter, </a:t>
-                </a:r>
-                <a14:m>
-                  <m:oMath xmlns:m="http://schemas.openxmlformats.org/officeDocument/2006/math">
-                    <m:r>
-                      <a:rPr>
-                        <a:latin typeface="Cambria Math" panose="02040503050406030204" pitchFamily="18" charset="0"/>
-                      </a:rPr>
-                      <m:t>𝛼</m:t>
-                    </m:r>
-                  </m:oMath>
-                </a14:m>
-                <a:r>
-                  <a:t>, increases smoothing</a:t>
-                </a:r>
-                <a:br/>
-                <a:endParaRPr/>
-              </a:p>
-              <a:p>
-                <a:pPr lvl="0"/>
-                <a:r>
-                  <a:t>Additionally, smooth trend</a:t>
-                </a:r>
-                <a:br/>
-                <a:endParaRPr/>
-              </a:p>
-              <a:p>
-                <a:pPr lvl="0"/>
-                <a:r>
-                  <a:t>Additional examples in </a:t>
-                </a:r>
-                <a:r>
-                  <a:rPr>
-                    <a:hlinkClick r:id="rId2"/>
-                  </a:rPr>
-                  <a:t>Statsmodels user documentation</a:t>
-                </a:r>
-              </a:p>
-            </p:txBody>
-          </p:sp>
-        </mc:Choice>
-        <mc:Fallback xmlns="">
-          <p:sp>
-            <p:nvSpPr>
-              <p:cNvPr id="4" name="Text Placeholder 3"/>
-              <p:cNvSpPr>
-                <a:spLocks noGrp="1" noRot="1" noChangeAspect="1" noMove="1" noResize="1" noEditPoints="1" noAdjustHandles="1" noChangeArrowheads="1" noChangeShapeType="1" noTextEdit="1"/>
-              </p:cNvSpPr>
-              <p:nvPr>
-                <p:ph type="body" sz="half" idx="2"/>
-              </p:nvPr>
-            </p:nvSpPr>
-            <p:spPr>
-              <a:blipFill>
-                <a:blip r:embed="rId3"/>
-                <a:stretch>
-                  <a:fillRect/>
-                </a:stretch>
-              </a:blipFill>
-            </p:spPr>
-            <p:txBody>
-              <a:bodyPr/>
-              <a:lstStyle/>
-              <a:p>
-                <a:r>
-                  <a:rPr lang="en-US">
-                    <a:noFill/>
-                  </a:rPr>
-                  <a:t> </a:t>
-                </a:r>
-              </a:p>
-            </p:txBody>
-          </p:sp>
-        </mc:Fallback>
-      </mc:AlternateContent>
-      <p:pic>
-        <p:nvPicPr>
-          <p:cNvPr id="3" name="Picture 1" descr="12_IntroductionToTimeSeriesForecasting_files/figure-pptx/unnamed-chunk-12-17.png"/>
-          <p:cNvPicPr>
-            <a:picLocks noGrp="1" noChangeAspect="1"/>
-          </p:cNvPicPr>
-          <p:nvPr/>
-        </p:nvPicPr>
-        <p:blipFill>
-          <a:blip r:embed="rId4"/>
-          <a:stretch>
-            <a:fillRect/>
-          </a:stretch>
-        </p:blipFill>
-        <p:spPr bwMode="auto">
-          <a:xfrm>
-            <a:off x="3568700" y="939800"/>
-            <a:ext cx="5105400" cy="2921000"/>
-          </a:xfrm>
-          <a:prstGeom prst="rect">
-            <a:avLst/>
-          </a:prstGeom>
-          <a:noFill/>
-          <a:ln w="9525">
-            <a:noFill/>
-            <a:headEnd/>
-            <a:tailEnd/>
-          </a:ln>
-        </p:spPr>
-      </p:pic>
     </p:spTree>
   </p:cSld>
   <p:clrMapOvr>

</xml_diff>

<commit_message>
Corrected typos in slides from lecture
</commit_message>
<xml_diff>
--- a/LectureSlides/12_IntroductionToTimeSeriesForecasting.pptx
+++ b/LectureSlides/12_IntroductionToTimeSeriesForecasting.pptx
@@ -5008,8 +5008,8 @@
             </p:nvSpPr>
             <p:spPr>
               <a:xfrm>
-                <a:off x="4908665" y="3507971"/>
-                <a:ext cx="3990109" cy="822469"/>
+                <a:off x="4508270" y="3507971"/>
+                <a:ext cx="4358240" cy="461665"/>
               </a:xfrm>
               <a:prstGeom prst="rect">
                 <a:avLst/>
@@ -5261,8 +5261,8 @@
             </p:nvSpPr>
             <p:spPr>
               <a:xfrm>
-                <a:off x="4908665" y="3507971"/>
-                <a:ext cx="3990109" cy="822469"/>
+                <a:off x="4508270" y="3507971"/>
+                <a:ext cx="4358240" cy="461665"/>
               </a:xfrm>
               <a:prstGeom prst="rect">
                 <a:avLst/>
@@ -5270,7 +5270,7 @@
               <a:blipFill>
                 <a:blip r:embed="rId5"/>
                 <a:stretch>
-                  <a:fillRect b="-9630"/>
+                  <a:fillRect b="-17105"/>
                 </a:stretch>
               </a:blipFill>
             </p:spPr>
@@ -6240,10 +6240,11 @@
                       </m:sub>
                     </m:sSub>
                     <m:r>
-                      <a:rPr lang="en-US" b="0" i="0" smtClean="0">
+                      <a:rPr lang="en-US">
                         <a:latin typeface="Cambria Math" panose="02040503050406030204" pitchFamily="18" charset="0"/>
+                        <a:ea typeface="Cambria Math" panose="02040503050406030204" pitchFamily="18" charset="0"/>
                       </a:rPr>
-                      <m:t>~</m:t>
+                      <m:t>≈</m:t>
                     </m:r>
                     <m:sSub>
                       <m:sSubPr>
@@ -8298,6 +8299,18 @@
                               </m:r>
                             </m:sub>
                           </m:sSub>
+                          <m:r>
+                            <a:rPr lang="en-US" b="0" i="1" smtClean="0">
+                              <a:latin typeface="Cambria Math" panose="02040503050406030204" pitchFamily="18" charset="0"/>
+                            </a:rPr>
+                            <m:t>+</m:t>
+                          </m:r>
+                          <m:r>
+                            <a:rPr lang="en-US" b="0" i="1" smtClean="0">
+                              <a:latin typeface="Cambria Math" panose="02040503050406030204" pitchFamily="18" charset="0"/>
+                            </a:rPr>
+                            <m:t>𝑐</m:t>
+                          </m:r>
                         </m:e>
                       </m:nary>
                     </m:oMath>
@@ -8872,11 +8885,11 @@
                         </m:e>
                         <m:sub>
                           <m:r>
-                            <a:rPr lang="en-US" sz="2000" i="1">
+                            <a:rPr lang="en-US" sz="2000" b="0" i="1" smtClean="0">
                               <a:latin typeface="Cambria Math" panose="02040503050406030204" pitchFamily="18" charset="0"/>
                               <a:ea typeface="Cambria Math" panose="02040503050406030204" pitchFamily="18" charset="0"/>
                             </a:rPr>
-                            <m:t>1</m:t>
+                            <m:t>2</m:t>
                           </m:r>
                         </m:sub>
                       </m:sSub>
@@ -9119,50 +9132,6 @@
           </p:sp>
         </mc:Fallback>
       </mc:AlternateContent>
-      <p:cxnSp>
-        <p:nvCxnSpPr>
-          <p:cNvPr id="7" name="Straight Arrow Connector 6">
-            <a:extLst>
-              <a:ext uri="{FF2B5EF4-FFF2-40B4-BE49-F238E27FC236}">
-                <a16:creationId xmlns:a16="http://schemas.microsoft.com/office/drawing/2014/main" id="{98B01785-6FF5-7791-8441-0803F46266EF}"/>
-              </a:ext>
-            </a:extLst>
-          </p:cNvPr>
-          <p:cNvCxnSpPr>
-            <a:cxnSpLocks/>
-          </p:cNvCxnSpPr>
-          <p:nvPr/>
-        </p:nvCxnSpPr>
-        <p:spPr>
-          <a:xfrm flipV="1">
-            <a:off x="4471737" y="1772653"/>
-            <a:ext cx="1471863" cy="1624263"/>
-          </a:xfrm>
-          <a:prstGeom prst="straightConnector1">
-            <a:avLst/>
-          </a:prstGeom>
-          <a:ln>
-            <a:solidFill>
-              <a:schemeClr val="tx1"/>
-            </a:solidFill>
-            <a:tailEnd type="triangle"/>
-          </a:ln>
-        </p:spPr>
-        <p:style>
-          <a:lnRef idx="2">
-            <a:schemeClr val="accent1"/>
-          </a:lnRef>
-          <a:fillRef idx="0">
-            <a:schemeClr val="accent1"/>
-          </a:fillRef>
-          <a:effectRef idx="1">
-            <a:schemeClr val="accent1"/>
-          </a:effectRef>
-          <a:fontRef idx="minor">
-            <a:schemeClr val="tx1"/>
-          </a:fontRef>
-        </p:style>
-      </p:cxnSp>
       <p:cxnSp>
         <p:nvCxnSpPr>
           <p:cNvPr id="18" name="Straight Arrow Connector 17">
@@ -9251,6 +9220,284 @@
           </a:fontRef>
         </p:style>
       </p:cxnSp>
+      <mc:AlternateContent xmlns:mc="http://schemas.openxmlformats.org/markup-compatibility/2006">
+        <mc:Choice xmlns:a14="http://schemas.microsoft.com/office/drawing/2010/main" Requires="a14">
+          <p:sp>
+            <p:nvSpPr>
+              <p:cNvPr id="11" name="TextBox 10">
+                <a:extLst>
+                  <a:ext uri="{FF2B5EF4-FFF2-40B4-BE49-F238E27FC236}">
+                    <a16:creationId xmlns:a16="http://schemas.microsoft.com/office/drawing/2014/main" id="{F50A3D86-7635-A427-A59A-098C2AFCC2E1}"/>
+                  </a:ext>
+                </a:extLst>
+              </p:cNvPr>
+              <p:cNvSpPr txBox="1"/>
+              <p:nvPr/>
+            </p:nvSpPr>
+            <p:spPr>
+              <a:xfrm>
+                <a:off x="7301839" y="1112870"/>
+                <a:ext cx="389878" cy="369332"/>
+              </a:xfrm>
+              <a:prstGeom prst="rect">
+                <a:avLst/>
+              </a:prstGeom>
+              <a:solidFill>
+                <a:schemeClr val="bg1"/>
+              </a:solidFill>
+            </p:spPr>
+            <p:txBody>
+              <a:bodyPr wrap="square" rtlCol="0">
+                <a:spAutoFit/>
+              </a:bodyPr>
+              <a:lstStyle/>
+              <a:p>
+                <a14:m>
+                  <m:oMathPara xmlns:m="http://schemas.openxmlformats.org/officeDocument/2006/math">
+                    <m:oMathParaPr>
+                      <m:jc m:val="centerGroup"/>
+                    </m:oMathParaPr>
+                    <m:oMath xmlns:m="http://schemas.openxmlformats.org/officeDocument/2006/math">
+                      <m:sSub>
+                        <m:sSubPr>
+                          <m:ctrlPr>
+                            <a:rPr lang="en-US" i="1" smtClean="0">
+                              <a:latin typeface="Cambria Math" panose="02040503050406030204" pitchFamily="18" charset="0"/>
+                            </a:rPr>
+                          </m:ctrlPr>
+                        </m:sSubPr>
+                        <m:e>
+                          <m:r>
+                            <a:rPr lang="en-US" i="1" smtClean="0">
+                              <a:latin typeface="Cambria Math" panose="02040503050406030204" pitchFamily="18" charset="0"/>
+                              <a:ea typeface="Cambria Math" panose="02040503050406030204" pitchFamily="18" charset="0"/>
+                            </a:rPr>
+                            <m:t>𝜙</m:t>
+                          </m:r>
+                        </m:e>
+                        <m:sub>
+                          <m:r>
+                            <a:rPr lang="en-US" b="0" i="1" smtClean="0">
+                              <a:latin typeface="Cambria Math" panose="02040503050406030204" pitchFamily="18" charset="0"/>
+                            </a:rPr>
+                            <m:t>2</m:t>
+                          </m:r>
+                        </m:sub>
+                      </m:sSub>
+                    </m:oMath>
+                  </m:oMathPara>
+                </a14:m>
+                <a:endParaRPr lang="en-US" dirty="0"/>
+              </a:p>
+            </p:txBody>
+          </p:sp>
+        </mc:Choice>
+        <mc:Fallback>
+          <p:sp>
+            <p:nvSpPr>
+              <p:cNvPr id="11" name="TextBox 10">
+                <a:extLst>
+                  <a:ext uri="{FF2B5EF4-FFF2-40B4-BE49-F238E27FC236}">
+                    <a16:creationId xmlns:a16="http://schemas.microsoft.com/office/drawing/2014/main" id="{F50A3D86-7635-A427-A59A-098C2AFCC2E1}"/>
+                  </a:ext>
+                </a:extLst>
+              </p:cNvPr>
+              <p:cNvSpPr txBox="1">
+                <a:spLocks noRot="1" noChangeAspect="1" noMove="1" noResize="1" noEditPoints="1" noAdjustHandles="1" noChangeArrowheads="1" noChangeShapeType="1" noTextEdit="1"/>
+              </p:cNvSpPr>
+              <p:nvPr/>
+            </p:nvSpPr>
+            <p:spPr>
+              <a:xfrm>
+                <a:off x="7301839" y="1112870"/>
+                <a:ext cx="389878" cy="369332"/>
+              </a:xfrm>
+              <a:prstGeom prst="rect">
+                <a:avLst/>
+              </a:prstGeom>
+              <a:blipFill>
+                <a:blip r:embed="rId5"/>
+                <a:stretch>
+                  <a:fillRect l="-4688" r="-3125" b="-13333"/>
+                </a:stretch>
+              </a:blipFill>
+            </p:spPr>
+            <p:txBody>
+              <a:bodyPr/>
+              <a:lstStyle/>
+              <a:p>
+                <a:r>
+                  <a:rPr lang="en-US">
+                    <a:noFill/>
+                  </a:rPr>
+                  <a:t> </a:t>
+                </a:r>
+              </a:p>
+            </p:txBody>
+          </p:sp>
+        </mc:Fallback>
+      </mc:AlternateContent>
+      <mc:AlternateContent xmlns:mc="http://schemas.openxmlformats.org/markup-compatibility/2006">
+        <mc:Choice xmlns:a14="http://schemas.microsoft.com/office/drawing/2010/main" Requires="a14">
+          <p:sp>
+            <p:nvSpPr>
+              <p:cNvPr id="12" name="TextBox 11">
+                <a:extLst>
+                  <a:ext uri="{FF2B5EF4-FFF2-40B4-BE49-F238E27FC236}">
+                    <a16:creationId xmlns:a16="http://schemas.microsoft.com/office/drawing/2014/main" id="{CBD13F0F-637C-A375-E0FB-1AA810AD4D95}"/>
+                  </a:ext>
+                </a:extLst>
+              </p:cNvPr>
+              <p:cNvSpPr txBox="1"/>
+              <p:nvPr/>
+            </p:nvSpPr>
+            <p:spPr>
+              <a:xfrm>
+                <a:off x="5483731" y="2023129"/>
+                <a:ext cx="389878" cy="369332"/>
+              </a:xfrm>
+              <a:prstGeom prst="rect">
+                <a:avLst/>
+              </a:prstGeom>
+              <a:solidFill>
+                <a:schemeClr val="bg1"/>
+              </a:solidFill>
+            </p:spPr>
+            <p:txBody>
+              <a:bodyPr wrap="square" rtlCol="0">
+                <a:spAutoFit/>
+              </a:bodyPr>
+              <a:lstStyle/>
+              <a:p>
+                <a14:m>
+                  <m:oMathPara xmlns:m="http://schemas.openxmlformats.org/officeDocument/2006/math">
+                    <m:oMathParaPr>
+                      <m:jc m:val="centerGroup"/>
+                    </m:oMathParaPr>
+                    <m:oMath xmlns:m="http://schemas.openxmlformats.org/officeDocument/2006/math">
+                      <m:sSub>
+                        <m:sSubPr>
+                          <m:ctrlPr>
+                            <a:rPr lang="en-US" i="1" smtClean="0">
+                              <a:latin typeface="Cambria Math" panose="02040503050406030204" pitchFamily="18" charset="0"/>
+                            </a:rPr>
+                          </m:ctrlPr>
+                        </m:sSubPr>
+                        <m:e>
+                          <m:r>
+                            <a:rPr lang="en-US" i="1" smtClean="0">
+                              <a:latin typeface="Cambria Math" panose="02040503050406030204" pitchFamily="18" charset="0"/>
+                              <a:ea typeface="Cambria Math" panose="02040503050406030204" pitchFamily="18" charset="0"/>
+                            </a:rPr>
+                            <m:t>𝜙</m:t>
+                          </m:r>
+                        </m:e>
+                        <m:sub>
+                          <m:r>
+                            <a:rPr lang="en-US" b="0" i="1" smtClean="0">
+                              <a:latin typeface="Cambria Math" panose="02040503050406030204" pitchFamily="18" charset="0"/>
+                            </a:rPr>
+                            <m:t>1</m:t>
+                          </m:r>
+                        </m:sub>
+                      </m:sSub>
+                    </m:oMath>
+                  </m:oMathPara>
+                </a14:m>
+                <a:endParaRPr lang="en-US" dirty="0"/>
+              </a:p>
+            </p:txBody>
+          </p:sp>
+        </mc:Choice>
+        <mc:Fallback>
+          <p:sp>
+            <p:nvSpPr>
+              <p:cNvPr id="12" name="TextBox 11">
+                <a:extLst>
+                  <a:ext uri="{FF2B5EF4-FFF2-40B4-BE49-F238E27FC236}">
+                    <a16:creationId xmlns:a16="http://schemas.microsoft.com/office/drawing/2014/main" id="{CBD13F0F-637C-A375-E0FB-1AA810AD4D95}"/>
+                  </a:ext>
+                </a:extLst>
+              </p:cNvPr>
+              <p:cNvSpPr txBox="1">
+                <a:spLocks noRot="1" noChangeAspect="1" noMove="1" noResize="1" noEditPoints="1" noAdjustHandles="1" noChangeArrowheads="1" noChangeShapeType="1" noTextEdit="1"/>
+              </p:cNvSpPr>
+              <p:nvPr/>
+            </p:nvSpPr>
+            <p:spPr>
+              <a:xfrm>
+                <a:off x="5483731" y="2023129"/>
+                <a:ext cx="389878" cy="369332"/>
+              </a:xfrm>
+              <a:prstGeom prst="rect">
+                <a:avLst/>
+              </a:prstGeom>
+              <a:blipFill>
+                <a:blip r:embed="rId6"/>
+                <a:stretch>
+                  <a:fillRect l="-4688" r="-1563" b="-13333"/>
+                </a:stretch>
+              </a:blipFill>
+            </p:spPr>
+            <p:txBody>
+              <a:bodyPr/>
+              <a:lstStyle/>
+              <a:p>
+                <a:r>
+                  <a:rPr lang="en-US">
+                    <a:noFill/>
+                  </a:rPr>
+                  <a:t> </a:t>
+                </a:r>
+              </a:p>
+            </p:txBody>
+          </p:sp>
+        </mc:Fallback>
+      </mc:AlternateContent>
+      <p:cxnSp>
+        <p:nvCxnSpPr>
+          <p:cNvPr id="7" name="Straight Arrow Connector 6">
+            <a:extLst>
+              <a:ext uri="{FF2B5EF4-FFF2-40B4-BE49-F238E27FC236}">
+                <a16:creationId xmlns:a16="http://schemas.microsoft.com/office/drawing/2014/main" id="{98B01785-6FF5-7791-8441-0803F46266EF}"/>
+              </a:ext>
+            </a:extLst>
+          </p:cNvPr>
+          <p:cNvCxnSpPr>
+            <a:cxnSpLocks/>
+          </p:cNvCxnSpPr>
+          <p:nvPr/>
+        </p:nvCxnSpPr>
+        <p:spPr>
+          <a:xfrm flipV="1">
+            <a:off x="4471737" y="1772653"/>
+            <a:ext cx="1238867" cy="1624263"/>
+          </a:xfrm>
+          <a:prstGeom prst="straightConnector1">
+            <a:avLst/>
+          </a:prstGeom>
+          <a:ln>
+            <a:solidFill>
+              <a:schemeClr val="tx1"/>
+            </a:solidFill>
+            <a:tailEnd type="triangle"/>
+          </a:ln>
+        </p:spPr>
+        <p:style>
+          <a:lnRef idx="2">
+            <a:schemeClr val="accent1"/>
+          </a:lnRef>
+          <a:fillRef idx="0">
+            <a:schemeClr val="accent1"/>
+          </a:fillRef>
+          <a:effectRef idx="1">
+            <a:schemeClr val="accent1"/>
+          </a:effectRef>
+          <a:fontRef idx="minor">
+            <a:schemeClr val="tx1"/>
+          </a:fontRef>
+        </p:style>
+      </p:cxnSp>
     </p:spTree>
     <p:extLst>
       <p:ext uri="{BB962C8B-B14F-4D97-AF65-F5344CB8AC3E}">
@@ -9831,7 +10078,7 @@
         </p:blipFill>
         <p:spPr>
           <a:xfrm>
-            <a:off x="5715001" y="133240"/>
+            <a:off x="5715001" y="142032"/>
             <a:ext cx="3013364" cy="4946074"/>
           </a:xfrm>
           <a:prstGeom prst="rect">
@@ -20675,7 +20922,8 @@
               <a:buNone/>
             </a:pPr>
             <a:r>
-              <a:t>SARIMAX Model</a:t>
+              <a:rPr dirty="0"/>
+              <a:t>SARIMA Model</a:t>
             </a:r>
           </a:p>
         </p:txBody>
@@ -20712,7 +20960,7 @@
             </a:r>
             <a:r>
               <a:rPr lang="en-US" b="1" dirty="0"/>
-              <a:t>multiplicative SARIMAX model </a:t>
+              <a:t>multiplicative SARIMA model </a:t>
             </a:r>
             <a:r>
               <a:rPr lang="en-US" dirty="0"/>
@@ -20851,13 +21099,14 @@
               <a:buNone/>
             </a:pPr>
             <a:r>
-              <a:t>SARIMAX Model</a:t>
+              <a:rPr dirty="0"/>
+              <a:t>SARIMA Model</a:t>
             </a:r>
           </a:p>
         </p:txBody>
       </p:sp>
-      <mc:AlternateContent xmlns:mc="http://schemas.openxmlformats.org/markup-compatibility/2006" xmlns:a14="http://schemas.microsoft.com/office/drawing/2010/main">
-        <mc:Choice Requires="a14">
+      <mc:AlternateContent xmlns:mc="http://schemas.openxmlformats.org/markup-compatibility/2006">
+        <mc:Choice xmlns:a14="http://schemas.microsoft.com/office/drawing/2010/main" Requires="a14">
           <p:sp>
             <p:nvSpPr>
               <p:cNvPr id="3" name="Content Placeholder 2"/>
@@ -20871,7 +21120,7 @@
             <p:spPr/>
             <p:txBody>
               <a:bodyPr>
-                <a:normAutofit fontScale="92500" lnSpcReduction="20000"/>
+                <a:normAutofit fontScale="92500"/>
               </a:bodyPr>
               <a:lstStyle/>
               <a:p>
@@ -21472,145 +21721,6 @@
                           </m:sSub>
                         </m:e>
                       </m:d>
-                      <m:d>
-                        <m:dPr>
-                          <m:ctrlPr>
-                            <a:rPr i="1">
-                              <a:latin typeface="Cambria Math" panose="02040503050406030204" pitchFamily="18" charset="0"/>
-                            </a:rPr>
-                          </m:ctrlPr>
-                        </m:dPr>
-                        <m:e>
-                          <m:r>
-                            <a:rPr>
-                              <a:latin typeface="Cambria Math" panose="02040503050406030204" pitchFamily="18" charset="0"/>
-                            </a:rPr>
-                            <m:t>1</m:t>
-                          </m:r>
-                          <m:r>
-                            <a:rPr>
-                              <a:latin typeface="Cambria Math" panose="02040503050406030204" pitchFamily="18" charset="0"/>
-                            </a:rPr>
-                            <m:t>−</m:t>
-                          </m:r>
-                          <m:sSub>
-                            <m:sSubPr>
-                              <m:ctrlPr>
-                                <a:rPr i="1">
-                                  <a:latin typeface="Cambria Math" panose="02040503050406030204" pitchFamily="18" charset="0"/>
-                                </a:rPr>
-                              </m:ctrlPr>
-                            </m:sSubPr>
-                            <m:e>
-                              <m:r>
-                                <a:rPr>
-                                  <a:latin typeface="Cambria Math" panose="02040503050406030204" pitchFamily="18" charset="0"/>
-                                </a:rPr>
-                                <m:t>𝑦</m:t>
-                              </m:r>
-                            </m:e>
-                            <m:sub>
-                              <m:r>
-                                <a:rPr>
-                                  <a:latin typeface="Cambria Math" panose="02040503050406030204" pitchFamily="18" charset="0"/>
-                                </a:rPr>
-                                <m:t>𝑡</m:t>
-                              </m:r>
-                              <m:r>
-                                <a:rPr>
-                                  <a:latin typeface="Cambria Math" panose="02040503050406030204" pitchFamily="18" charset="0"/>
-                                </a:rPr>
-                                <m:t>−</m:t>
-                              </m:r>
-                              <m:r>
-                                <a:rPr>
-                                  <a:latin typeface="Cambria Math" panose="02040503050406030204" pitchFamily="18" charset="0"/>
-                                </a:rPr>
-                                <m:t>1</m:t>
-                              </m:r>
-                            </m:sub>
-                          </m:sSub>
-                        </m:e>
-                      </m:d>
-                      <m:d>
-                        <m:dPr>
-                          <m:ctrlPr>
-                            <a:rPr i="1">
-                              <a:latin typeface="Cambria Math" panose="02040503050406030204" pitchFamily="18" charset="0"/>
-                            </a:rPr>
-                          </m:ctrlPr>
-                        </m:dPr>
-                        <m:e>
-                          <m:sSub>
-                            <m:sSubPr>
-                              <m:ctrlPr>
-                                <a:rPr i="1">
-                                  <a:latin typeface="Cambria Math" panose="02040503050406030204" pitchFamily="18" charset="0"/>
-                                </a:rPr>
-                              </m:ctrlPr>
-                            </m:sSubPr>
-                            <m:e>
-                              <m:r>
-                                <a:rPr>
-                                  <a:latin typeface="Cambria Math" panose="02040503050406030204" pitchFamily="18" charset="0"/>
-                                </a:rPr>
-                                <m:t>𝑦</m:t>
-                              </m:r>
-                            </m:e>
-                            <m:sub>
-                              <m:r>
-                                <a:rPr>
-                                  <a:latin typeface="Cambria Math" panose="02040503050406030204" pitchFamily="18" charset="0"/>
-                                </a:rPr>
-                                <m:t>𝑡</m:t>
-                              </m:r>
-                            </m:sub>
-                          </m:sSub>
-                          <m:r>
-                            <a:rPr>
-                              <a:latin typeface="Cambria Math" panose="02040503050406030204" pitchFamily="18" charset="0"/>
-                            </a:rPr>
-                            <m:t>−</m:t>
-                          </m:r>
-                          <m:sSub>
-                            <m:sSubPr>
-                              <m:ctrlPr>
-                                <a:rPr i="1">
-                                  <a:latin typeface="Cambria Math" panose="02040503050406030204" pitchFamily="18" charset="0"/>
-                                </a:rPr>
-                              </m:ctrlPr>
-                            </m:sSubPr>
-                            <m:e>
-                              <m:r>
-                                <a:rPr>
-                                  <a:latin typeface="Cambria Math" panose="02040503050406030204" pitchFamily="18" charset="0"/>
-                                </a:rPr>
-                                <m:t>𝑦</m:t>
-                              </m:r>
-                            </m:e>
-                            <m:sub>
-                              <m:r>
-                                <a:rPr>
-                                  <a:latin typeface="Cambria Math" panose="02040503050406030204" pitchFamily="18" charset="0"/>
-                                </a:rPr>
-                                <m:t>𝑡</m:t>
-                              </m:r>
-                              <m:r>
-                                <a:rPr>
-                                  <a:latin typeface="Cambria Math" panose="02040503050406030204" pitchFamily="18" charset="0"/>
-                                </a:rPr>
-                                <m:t>−</m:t>
-                              </m:r>
-                              <m:r>
-                                <a:rPr>
-                                  <a:latin typeface="Cambria Math" panose="02040503050406030204" pitchFamily="18" charset="0"/>
-                                </a:rPr>
-                                <m:t>𝑆</m:t>
-                              </m:r>
-                            </m:sub>
-                          </m:sSub>
-                        </m:e>
-                      </m:d>
                       <m:r>
                         <a:rPr>
                           <a:latin typeface="Cambria Math" panose="02040503050406030204" pitchFamily="18" charset="0"/>
@@ -21950,7 +22060,7 @@
             </p:txBody>
           </p:sp>
         </mc:Choice>
-        <mc:Fallback xmlns="">
+        <mc:Fallback>
           <p:sp>
             <p:nvSpPr>
               <p:cNvPr id="3" name="Content Placeholder 2"/>
@@ -21965,7 +22075,7 @@
               <a:blipFill>
                 <a:blip r:embed="rId2"/>
                 <a:stretch>
-                  <a:fillRect l="-963" t="-3052"/>
+                  <a:fillRect l="-963" t="-1257" b="-3052"/>
                 </a:stretch>
               </a:blipFill>
             </p:spPr>
@@ -22028,6 +22138,7 @@
               <a:buNone/>
             </a:pPr>
             <a:r>
+              <a:rPr dirty="0"/>
               <a:t>SARIMAX Model</a:t>
             </a:r>
           </a:p>
@@ -22069,7 +22180,7 @@
                 </a:r>
                 <a:r>
                   <a:rPr lang="en-US" dirty="0"/>
-                  <a:t>start with polynomial equation with no exogenous variables</a:t>
+                  <a:t>start with polynomial equation of the SARIMA model</a:t>
                 </a:r>
                 <a:endParaRPr dirty="0"/>
               </a:p>
@@ -22935,8 +23046,12 @@
                   <a:buNone/>
                 </a:pPr>
                 <a:r>
+                  <a:rPr lang="en-US" b="1" dirty="0"/>
+                  <a:t>SARIMAX model </a:t>
+                </a:r>
+                <a:r>
                   <a:rPr lang="en-US" dirty="0"/>
-                  <a:t>SARIMAX model can include </a:t>
+                  <a:t>can include </a:t>
                 </a:r>
                 <a:r>
                   <a:rPr lang="en-US" b="1" dirty="0"/>
@@ -23613,7 +23728,7 @@
               <a:blipFill>
                 <a:blip r:embed="rId2"/>
                 <a:stretch>
-                  <a:fillRect l="-1111" t="-1436" r="-1481" b="-898"/>
+                  <a:fillRect l="-1111" t="-1436" b="-898"/>
                 </a:stretch>
               </a:blipFill>
             </p:spPr>
@@ -25151,10 +25266,10 @@
                             </m:sub>
                           </m:sSub>
                           <m:r>
-                            <a:rPr lang="ar-AE">
-                              <a:latin typeface="Cambria Math" panose="02040503050406030204" pitchFamily="18" charset="0"/>
-                            </a:rPr>
-                            <m:t>+</m:t>
+                            <a:rPr lang="en-US" b="0" i="0" smtClean="0">
+                              <a:latin typeface="Cambria Math" panose="02040503050406030204" pitchFamily="18" charset="0"/>
+                            </a:rPr>
+                            <m:t>−</m:t>
                           </m:r>
                           <m:sSub>
                             <m:sSubPr>

</xml_diff>